<commit_message>
fix PCF root policy file & slide
</commit_message>
<xml_diff>
--- a/ppt/DAP-Policy-Model-200615JH.pptx
+++ b/ppt/DAP-Policy-Model-200615JH.pptx
@@ -257,7 +257,7 @@
           <a:p>
             <a:fld id="{731C07B1-AB0B-5848-BE9C-30B9B2692C04}" type="datetimeFigureOut">
               <a:rPr lang="en-US" smtClean="0"/>
-              <a:t>6/16/20</a:t>
+              <a:t>6/19/20</a:t>
             </a:fld>
             <a:endParaRPr lang="en-US"/>
           </a:p>
@@ -12674,7 +12674,7 @@
         </p:spPr>
         <p:txBody>
           <a:bodyPr wrap="square" rtlCol="0">
-            <a:normAutofit fontScale="92500" lnSpcReduction="20000"/>
+            <a:normAutofit/>
           </a:bodyPr>
           <a:lstStyle>
             <a:defPPr>
@@ -12688,218 +12688,175 @@
           </a:lstStyle>
           <a:p>
             <a:r>
-              <a:rPr lang="en-US" sz="1050" dirty="0"/>
+              <a:rPr lang="en-US" sz="1000" dirty="0"/>
               <a:t># =================================================</a:t>
             </a:r>
           </a:p>
           <a:p>
             <a:r>
-              <a:rPr lang="en-US" sz="1050" dirty="0"/>
+              <a:rPr lang="en-US" sz="1000" dirty="0"/>
               <a:t># PCF SERVICE BROKER ROOT POLICY</a:t>
             </a:r>
           </a:p>
           <a:p>
             <a:r>
-              <a:rPr lang="en-US" sz="1050" dirty="0"/>
+              <a:rPr lang="en-US" sz="1000" dirty="0"/>
               <a:t># Create host &amp; permissions for PCF service broker</a:t>
             </a:r>
           </a:p>
           <a:p>
             <a:r>
-              <a:rPr lang="en-US" sz="1050" dirty="0"/>
+              <a:rPr lang="en-US" sz="1000" dirty="0"/>
               <a:t># Note no indentation – this is created “under” the root policy</a:t>
             </a:r>
           </a:p>
           <a:p>
             <a:r>
-              <a:rPr lang="en-US" sz="1050" dirty="0"/>
+              <a:rPr lang="en-US" sz="1000" dirty="0"/>
               <a:t># This policy must be bulk-loaded with other root policies.</a:t>
             </a:r>
           </a:p>
           <a:p>
             <a:r>
-              <a:rPr lang="en-US" sz="1050" dirty="0"/>
+              <a:rPr lang="en-US" sz="1000" dirty="0"/>
               <a:t># Create one policy per PCF service broker.</a:t>
             </a:r>
           </a:p>
           <a:p>
             <a:r>
-              <a:rPr lang="en-US" sz="1050" dirty="0"/>
+              <a:rPr lang="en-US" sz="1000" dirty="0"/>
               <a:t># =================================================</a:t>
             </a:r>
           </a:p>
           <a:p>
-            <a:endParaRPr lang="en-US" sz="1050" dirty="0"/>
-          </a:p>
-          <a:p>
-            <a:r>
-              <a:rPr lang="en-US" sz="1050" dirty="0"/>
-              <a:t>- !host</a:t>
-            </a:r>
-          </a:p>
-          <a:p>
-            <a:r>
-              <a:rPr lang="en-US" sz="1050" dirty="0"/>
+            <a:endParaRPr lang="en-US" sz="1000" dirty="0"/>
+          </a:p>
+          <a:p>
+            <a:r>
+              <a:rPr lang="en-US" sz="1000" dirty="0"/>
+              <a:t>- !policy</a:t>
+            </a:r>
+          </a:p>
+          <a:p>
+            <a:r>
+              <a:rPr lang="en-US" sz="1000" dirty="0"/>
               <a:t>  id: </a:t>
             </a:r>
             <a:r>
-              <a:rPr lang="en-US" sz="1050" dirty="0" err="1"/>
+              <a:rPr lang="en-US" sz="1000" dirty="0" err="1"/>
               <a:t>pcf</a:t>
             </a:r>
-            <a:r>
-              <a:rPr lang="en-US" sz="1050" dirty="0"/>
+            <a:endParaRPr lang="en-US" sz="1000" dirty="0"/>
+          </a:p>
+          <a:p>
+            <a:r>
+              <a:rPr lang="en-US" sz="1000" dirty="0"/>
+              <a:t>  body:</a:t>
+            </a:r>
+          </a:p>
+          <a:p>
+            <a:r>
+              <a:rPr lang="en-US" sz="1000" dirty="0"/>
+              <a:t>   - !host</a:t>
+            </a:r>
+          </a:p>
+          <a:p>
+            <a:r>
+              <a:rPr lang="en-US" sz="1000" dirty="0"/>
+              <a:t>     id: </a:t>
+            </a:r>
+            <a:r>
+              <a:rPr lang="en-US" sz="1000" dirty="0" err="1"/>
+              <a:t>pcf</a:t>
+            </a:r>
+            <a:r>
+              <a:rPr lang="en-US" sz="1000" dirty="0"/>
               <a:t>-service-broker</a:t>
             </a:r>
           </a:p>
           <a:p>
-            <a:r>
-              <a:rPr lang="en-US" sz="1050" dirty="0"/>
-              <a:t>  annotations:</a:t>
-            </a:r>
-          </a:p>
-          <a:p>
-            <a:r>
-              <a:rPr lang="en-US" sz="1050" dirty="0"/>
-              <a:t>    platform: </a:t>
-            </a:r>
-            <a:r>
-              <a:rPr lang="en-US" sz="1050" dirty="0" err="1"/>
-              <a:t>pivotalcloudfoundry</a:t>
-            </a:r>
-            <a:endParaRPr lang="en-US" sz="1050" dirty="0"/>
-          </a:p>
-          <a:p>
-            <a:endParaRPr lang="en-US" sz="1050" dirty="0"/>
-          </a:p>
-          <a:p>
-            <a:r>
-              <a:rPr lang="en-US" sz="1050" dirty="0"/>
-              <a:t># Allow host read access to its own resource, to read annotations</a:t>
-            </a:r>
-          </a:p>
-          <a:p>
-            <a:r>
-              <a:rPr lang="en-US" sz="1050" dirty="0"/>
-              <a:t>- !permit</a:t>
-            </a:r>
-          </a:p>
-          <a:p>
-            <a:r>
-              <a:rPr lang="en-US" sz="1050" dirty="0"/>
-              <a:t>  role: !host </a:t>
-            </a:r>
-            <a:r>
-              <a:rPr lang="en-US" sz="1050" dirty="0" err="1"/>
+            <a:endParaRPr lang="en-US" sz="1000" dirty="0"/>
+          </a:p>
+          <a:p>
+            <a:r>
+              <a:rPr lang="en-US" sz="1000" dirty="0"/>
+              <a:t>   - !permit</a:t>
+            </a:r>
+          </a:p>
+          <a:p>
+            <a:r>
+              <a:rPr lang="en-US" sz="1000" dirty="0"/>
+              <a:t>     role: !host </a:t>
+            </a:r>
+            <a:r>
+              <a:rPr lang="en-US" sz="1000" dirty="0" err="1"/>
               <a:t>pcf</a:t>
             </a:r>
             <a:r>
-              <a:rPr lang="en-US" sz="1050" dirty="0"/>
+              <a:rPr lang="en-US" sz="1000" dirty="0"/>
               <a:t>-service-broker</a:t>
             </a:r>
           </a:p>
           <a:p>
             <a:r>
-              <a:rPr lang="en-US" sz="1050" dirty="0"/>
-              <a:t>  privilege: read</a:t>
-            </a:r>
-          </a:p>
-          <a:p>
-            <a:r>
-              <a:rPr lang="en-US" sz="1050" dirty="0"/>
-              <a:t>  resource: !host </a:t>
-            </a:r>
-            <a:r>
-              <a:rPr lang="en-US" sz="1050" dirty="0" err="1"/>
+              <a:rPr lang="en-US" sz="1000" dirty="0"/>
+              <a:t>     privileges: [ read ]</a:t>
+            </a:r>
+          </a:p>
+          <a:p>
+            <a:r>
+              <a:rPr lang="en-US" sz="1000" dirty="0"/>
+              <a:t>     resource: !host </a:t>
+            </a:r>
+            <a:r>
+              <a:rPr lang="en-US" sz="1000" dirty="0" err="1"/>
               <a:t>pcf</a:t>
             </a:r>
             <a:r>
-              <a:rPr lang="en-US" sz="1050" dirty="0"/>
+              <a:rPr lang="en-US" sz="1000" dirty="0"/>
               <a:t>-service-broker</a:t>
             </a:r>
           </a:p>
           <a:p>
-            <a:endParaRPr lang="en-US" sz="1050" dirty="0"/>
-          </a:p>
-          <a:p>
-            <a:r>
-              <a:rPr lang="en-US" sz="1050" dirty="0"/>
-              <a:t># Policy ID does not have to be </a:t>
-            </a:r>
-            <a:r>
-              <a:rPr lang="en-US" sz="1050" dirty="0" err="1"/>
+            <a:endParaRPr lang="en-US" sz="1000" dirty="0"/>
+          </a:p>
+          <a:p>
+            <a:r>
+              <a:rPr lang="en-US" sz="1000" dirty="0"/>
+              <a:t>   - !policy</a:t>
+            </a:r>
+          </a:p>
+          <a:p>
+            <a:r>
+              <a:rPr lang="en-US" sz="1000" dirty="0"/>
+              <a:t>      id: sandbox</a:t>
+            </a:r>
+          </a:p>
+          <a:p>
+            <a:r>
+              <a:rPr lang="en-US" sz="1000" dirty="0"/>
+              <a:t>      owner: !host </a:t>
+            </a:r>
+            <a:r>
+              <a:rPr lang="en-US" sz="1000" dirty="0" err="1"/>
               <a:t>pcf</a:t>
             </a:r>
-            <a:endParaRPr lang="en-US" sz="1050" dirty="0"/>
-          </a:p>
-          <a:p>
-            <a:r>
-              <a:rPr lang="en-US" sz="1050" dirty="0"/>
-              <a:t>- !policy</a:t>
-            </a:r>
-          </a:p>
-          <a:p>
-            <a:r>
-              <a:rPr lang="en-US" sz="1050" dirty="0"/>
-              <a:t>  id: </a:t>
-            </a:r>
-            <a:r>
-              <a:rPr lang="en-US" sz="1050" dirty="0" err="1"/>
-              <a:t>pcf</a:t>
-            </a:r>
-            <a:endParaRPr lang="en-US" sz="1050" dirty="0"/>
-          </a:p>
-          <a:p>
-            <a:r>
-              <a:rPr lang="en-US" sz="1050" dirty="0"/>
-              <a:t>  body:</a:t>
-            </a:r>
-          </a:p>
-          <a:p>
-            <a:endParaRPr lang="en-US" sz="1050" dirty="0"/>
-          </a:p>
-          <a:p>
-            <a:r>
-              <a:rPr lang="en-US" sz="1050" dirty="0"/>
-              <a:t>    # Multiple VMware </a:t>
-            </a:r>
-            <a:r>
-              <a:rPr lang="en-US" sz="1050" dirty="0" err="1"/>
-              <a:t>Tanzu</a:t>
-            </a:r>
-            <a:r>
-              <a:rPr lang="en-US" sz="1050" dirty="0"/>
-              <a:t> Foundations may be identified</a:t>
-            </a:r>
-          </a:p>
-          <a:p>
-            <a:r>
-              <a:rPr lang="en-US" sz="1050" dirty="0"/>
-              <a:t>    # using a sub-policy branch, e.g. "production".</a:t>
-            </a:r>
-          </a:p>
-          <a:p>
-            <a:r>
-              <a:rPr lang="en-US" sz="1050" dirty="0"/>
-              <a:t>  - !policy</a:t>
-            </a:r>
-          </a:p>
-          <a:p>
-            <a:r>
-              <a:rPr lang="en-US" sz="1050" dirty="0"/>
-              <a:t>    id: production</a:t>
-            </a:r>
-          </a:p>
-          <a:p>
-            <a:endParaRPr lang="en-US" sz="1050" dirty="0"/>
-          </a:p>
-          <a:p>
-            <a:r>
-              <a:rPr lang="en-US" sz="1050" dirty="0"/>
+            <a:r>
+              <a:rPr lang="en-US" sz="1000" dirty="0"/>
+              <a:t>-service-broker</a:t>
+            </a:r>
+          </a:p>
+          <a:p>
+            <a:endParaRPr lang="en-US" sz="1000" dirty="0"/>
+          </a:p>
+          <a:p>
+            <a:r>
+              <a:rPr lang="en-US" sz="1000" dirty="0"/>
               <a:t># END PCF SERVICE BROKER</a:t>
             </a:r>
           </a:p>
           <a:p>
-            <a:endParaRPr lang="en-US" sz="1050" dirty="0"/>
+            <a:endParaRPr lang="en-US" sz="1000" dirty="0"/>
           </a:p>
         </p:txBody>
       </p:sp>

</xml_diff>

<commit_message>
update slides for seed-service, authn-oidc & name changes
</commit_message>
<xml_diff>
--- a/ppt/DAP-Policy-Model-200615JH.pptx
+++ b/ppt/DAP-Policy-Model-200615JH.pptx
@@ -6,7 +6,7 @@
     <p:sldMasterId id="2147483678" r:id="rId2"/>
   </p:sldMasterIdLst>
   <p:notesMasterIdLst>
-    <p:notesMasterId r:id="rId30"/>
+    <p:notesMasterId r:id="rId31"/>
   </p:notesMasterIdLst>
   <p:sldIdLst>
     <p:sldId id="962" r:id="rId3"/>
@@ -28,14 +28,15 @@
     <p:sldId id="971" r:id="rId19"/>
     <p:sldId id="991" r:id="rId20"/>
     <p:sldId id="995" r:id="rId21"/>
-    <p:sldId id="972" r:id="rId22"/>
-    <p:sldId id="993" r:id="rId23"/>
-    <p:sldId id="975" r:id="rId24"/>
-    <p:sldId id="997" r:id="rId25"/>
-    <p:sldId id="989" r:id="rId26"/>
-    <p:sldId id="998" r:id="rId27"/>
-    <p:sldId id="980" r:id="rId28"/>
-    <p:sldId id="965" r:id="rId29"/>
+    <p:sldId id="999" r:id="rId22"/>
+    <p:sldId id="972" r:id="rId23"/>
+    <p:sldId id="993" r:id="rId24"/>
+    <p:sldId id="975" r:id="rId25"/>
+    <p:sldId id="997" r:id="rId26"/>
+    <p:sldId id="989" r:id="rId27"/>
+    <p:sldId id="998" r:id="rId28"/>
+    <p:sldId id="980" r:id="rId29"/>
+    <p:sldId id="965" r:id="rId30"/>
   </p:sldIdLst>
   <p:sldSz cx="12192000" cy="6858000"/>
   <p:notesSz cx="6858000" cy="9144000"/>
@@ -257,7 +258,7 @@
           <a:p>
             <a:fld id="{731C07B1-AB0B-5848-BE9C-30B9B2692C04}" type="datetimeFigureOut">
               <a:rPr lang="en-US" smtClean="0"/>
-              <a:t>6/19/20</a:t>
+              <a:t>6/23/20</a:t>
             </a:fld>
             <a:endParaRPr lang="en-US"/>
           </a:p>
@@ -673,7 +674,7 @@
           <a:p>
             <a:fld id="{BC714219-9874-EB4A-A5DF-E8E2BB358916}" type="slidenum">
               <a:rPr lang="en-US" smtClean="0"/>
-              <a:t>25</a:t>
+              <a:t>26</a:t>
             </a:fld>
             <a:endParaRPr lang="en-US"/>
           </a:p>
@@ -1345,7 +1346,7 @@
           <a:p>
             <a:fld id="{BC714219-9874-EB4A-A5DF-E8E2BB358916}" type="slidenum">
               <a:rPr lang="en-US" smtClean="0"/>
-              <a:t>24</a:t>
+              <a:t>25</a:t>
             </a:fld>
             <a:endParaRPr lang="en-US"/>
           </a:p>
@@ -9782,7 +9783,7 @@
             <a:pPr lvl="1"/>
             <a:r>
               <a:rPr lang="en-US" dirty="0"/>
-              <a:t>07-seedfetcher.yml – defines an authn-k8s identity for Follower self-</a:t>
+              <a:t>07-k8s-ocp-follower.yml – defines an authn-k8s identity for Followers self-</a:t>
             </a:r>
             <a:r>
               <a:rPr lang="en-US" dirty="0" err="1"/>
@@ -9809,7 +9810,14 @@
             <a:pPr lvl="1"/>
             <a:r>
               <a:rPr lang="en-US" dirty="0"/>
-              <a:t>09-appteam1.yml – defines base policy for an application team</a:t>
+              <a:t>09-authn-oidc.yml - defines</a:t>
+            </a:r>
+          </a:p>
+          <a:p>
+            <a:pPr lvl="1"/>
+            <a:r>
+              <a:rPr lang="en-US" dirty="0"/>
+              <a:t>10-appteam1.yml – defines base policy for an application team</a:t>
             </a:r>
           </a:p>
           <a:p>
@@ -12011,67 +12019,69 @@
           <a:p>
             <a:r>
               <a:rPr lang="en-US" sz="1050" dirty="0"/>
-              <a:t>    # =================================================</a:t>
+              <a:t>  # =================================================</a:t>
             </a:r>
           </a:p>
           <a:p>
             <a:r>
               <a:rPr lang="en-US" sz="1050" dirty="0"/>
-              <a:t>    # SEED-SERVICE ROOT POLICY</a:t>
+              <a:t>  # SEED-SERVICE ROOT POLICY</a:t>
             </a:r>
           </a:p>
           <a:p>
             <a:r>
               <a:rPr lang="en-US" sz="1050" dirty="0"/>
-              <a:t>    # Create webservice and consumers role for the Seed Service</a:t>
+              <a:t>  # Create webservice and consumers role for the Seed Service</a:t>
             </a:r>
           </a:p>
           <a:p>
             <a:r>
               <a:rPr lang="en-US" sz="1050" dirty="0"/>
-              <a:t>    # Note 4-space indentation – this is created “under” each authn-k8s policy</a:t>
-            </a:r>
-          </a:p>
-          <a:p>
+              <a:t>  # Note 2-space indentation – this is created “under” the </a:t>
+            </a:r>
+            <a:r>
+              <a:rPr lang="en-US" sz="1050" dirty="0" err="1"/>
+              <a:t>conjur</a:t>
+            </a:r>
             <a:r>
               <a:rPr lang="en-US" sz="1050" dirty="0"/>
-              <a:t>    # This policy must be bulk-loaded with other root policies.</a:t>
+              <a:t> base policy</a:t>
             </a:r>
           </a:p>
           <a:p>
             <a:r>
               <a:rPr lang="en-US" sz="1050" dirty="0"/>
-              <a:t>    # Create one policy per authn-k8s webservice endpoint (one per cluster).</a:t>
+              <a:t>  # This policy must be bulk-loaded with other root policies.</a:t>
             </a:r>
           </a:p>
           <a:p>
             <a:r>
               <a:rPr lang="en-US" sz="1050" dirty="0"/>
-              <a:t>    # =================================================</a:t>
+              <a:t>  # =================================================</a:t>
             </a:r>
           </a:p>
           <a:p>
             <a:r>
               <a:rPr lang="en-US" sz="1050" dirty="0"/>
-              <a:t>    - !policy</a:t>
+              <a:t>  - !policy</a:t>
             </a:r>
           </a:p>
           <a:p>
             <a:r>
               <a:rPr lang="en-US" sz="1050" dirty="0"/>
-              <a:t>      id: seed-generation</a:t>
+              <a:t>    id: seed-generation</a:t>
             </a:r>
           </a:p>
           <a:p>
             <a:r>
               <a:rPr lang="en-US" sz="1050" dirty="0"/>
-              <a:t>      body:</a:t>
+              <a:t>    body:</a:t>
             </a:r>
           </a:p>
           <a:p>
             <a:r>
               <a:rPr lang="en-US" sz="1050" dirty="0"/>
-              <a:t>      - !webservice</a:t>
+              <a:t>    - !webservice</a:t>
             </a:r>
           </a:p>
           <a:p>
@@ -12080,19 +12090,19 @@
           <a:p>
             <a:r>
               <a:rPr lang="en-US" sz="1050" dirty="0"/>
-              <a:t>      # Hosts that generate seeds become members of the</a:t>
+              <a:t>    # Hosts that generate seeds become members of the</a:t>
             </a:r>
           </a:p>
           <a:p>
             <a:r>
               <a:rPr lang="en-US" sz="1050" dirty="0"/>
-              <a:t>      # `consumers` group.</a:t>
+              <a:t>    # `consumers` group.</a:t>
             </a:r>
           </a:p>
           <a:p>
             <a:r>
               <a:rPr lang="en-US" sz="1050" dirty="0"/>
-              <a:t>      - !group consumers</a:t>
+              <a:t>    - !group consumers</a:t>
             </a:r>
           </a:p>
           <a:p>
@@ -12101,31 +12111,31 @@
           <a:p>
             <a:r>
               <a:rPr lang="en-US" sz="1050" dirty="0"/>
-              <a:t>      # Authorize `consumers` to request seeds</a:t>
+              <a:t>    # Authorize `consumers` to request seeds</a:t>
             </a:r>
           </a:p>
           <a:p>
             <a:r>
               <a:rPr lang="en-US" sz="1050" dirty="0"/>
-              <a:t>      - !permit</a:t>
+              <a:t>    - !permit</a:t>
             </a:r>
           </a:p>
           <a:p>
             <a:r>
               <a:rPr lang="en-US" sz="1050" dirty="0"/>
-              <a:t>        role: !group consumers</a:t>
+              <a:t>      role: !group consumers</a:t>
             </a:r>
           </a:p>
           <a:p>
             <a:r>
               <a:rPr lang="en-US" sz="1050" dirty="0"/>
-              <a:t>        privilege: [ "execute" ]</a:t>
+              <a:t>      privilege: [ "execute" ]</a:t>
             </a:r>
           </a:p>
           <a:p>
             <a:r>
               <a:rPr lang="en-US" sz="1050" dirty="0"/>
-              <a:t>        resource: !webservice</a:t>
+              <a:t>      resource: !webservice</a:t>
             </a:r>
           </a:p>
           <a:p>
@@ -12134,7 +12144,7 @@
           <a:p>
             <a:r>
               <a:rPr lang="en-US" sz="1050" dirty="0"/>
-              <a:t>    # END SEED-SERVICE</a:t>
+              <a:t>  # END SEED-SERVICE</a:t>
             </a:r>
           </a:p>
           <a:p>
@@ -12268,7 +12278,7 @@
           <a:p>
             <a:r>
               <a:rPr lang="en-US" dirty="0"/>
-              <a:t>07-seedfetcher.yml</a:t>
+              <a:t>07-k8s-ocp-follower.yml</a:t>
             </a:r>
           </a:p>
         </p:txBody>
@@ -12332,7 +12342,7 @@
           <a:p>
             <a:r>
               <a:rPr lang="en-US" sz="1000" dirty="0"/>
-              <a:t># SEEDFETCHER IDENTITY POLICY</a:t>
+              <a:t># K8s/OCP FOLLOWER IDENTITY POLICY</a:t>
             </a:r>
           </a:p>
           <a:p>
@@ -13635,7 +13645,7 @@
           <a:p>
             <a:r>
               <a:rPr lang="en-US" dirty="0"/>
-              <a:t>09-Appteam1.yml</a:t>
+              <a:t>09-authn-oidc.yml</a:t>
             </a:r>
           </a:p>
         </p:txBody>
@@ -13655,7 +13665,7 @@
         <p:spPr>
           <a:xfrm>
             <a:off x="1280160" y="1005839"/>
-            <a:ext cx="9584871" cy="4875977"/>
+            <a:ext cx="9584871" cy="4182610"/>
           </a:xfrm>
           <a:prstGeom prst="rect">
             <a:avLst/>
@@ -13678,7 +13688,7 @@
         </p:spPr>
         <p:txBody>
           <a:bodyPr wrap="square" rtlCol="0">
-            <a:normAutofit fontScale="92500" lnSpcReduction="10000"/>
+            <a:normAutofit lnSpcReduction="10000"/>
           </a:bodyPr>
           <a:lstStyle>
             <a:defPPr>
@@ -13693,160 +13703,25 @@
           <a:p>
             <a:r>
               <a:rPr lang="en-US" sz="1000" dirty="0"/>
-              <a:t>#======================</a:t>
+              <a:t> # =================================================</a:t>
             </a:r>
           </a:p>
           <a:p>
             <a:r>
               <a:rPr lang="en-US" sz="1000" dirty="0"/>
-              <a:t># APPTEAM1 ROOT POLICY</a:t>
+              <a:t>  # AUTHN-OIDC ROOT POLICY</a:t>
             </a:r>
           </a:p>
           <a:p>
             <a:r>
               <a:rPr lang="en-US" sz="1000" dirty="0"/>
-              <a:t># </a:t>
-            </a:r>
-            <a:r>
-              <a:rPr lang="en-US" sz="1000" dirty="0" err="1"/>
-              <a:t>AppTeam</a:t>
-            </a:r>
+              <a:t>  # Creates webservice and consumers role for OIDC authentication</a:t>
+            </a:r>
+          </a:p>
+          <a:p>
             <a:r>
               <a:rPr lang="en-US" sz="1000" dirty="0"/>
-              <a:t> Policy Template where policy namespace = EPV safe name</a:t>
-            </a:r>
-          </a:p>
-          <a:p>
-            <a:r>
-              <a:rPr lang="en-US" sz="1000" dirty="0"/>
-              <a:t># Creates admin identity to delegate policy </a:t>
-            </a:r>
-            <a:r>
-              <a:rPr lang="en-US" sz="1000" dirty="0" err="1"/>
-              <a:t>mgmt</a:t>
-            </a:r>
-            <a:r>
-              <a:rPr lang="en-US" sz="1000" dirty="0"/>
-              <a:t> and role to grant authn to app identities.</a:t>
-            </a:r>
-          </a:p>
-          <a:p>
-            <a:r>
-              <a:rPr lang="en-US" sz="1000" dirty="0"/>
-              <a:t># This policy must be bulk-loaded with other root policies.</a:t>
-            </a:r>
-          </a:p>
-          <a:p>
-            <a:r>
-              <a:rPr lang="en-US" sz="1000" dirty="0"/>
-              <a:t># Create one policy for each application team, named for the application team.</a:t>
-            </a:r>
-          </a:p>
-          <a:p>
-            <a:r>
-              <a:rPr lang="en-US" sz="1000" dirty="0"/>
-              <a:t>#======================</a:t>
-            </a:r>
-          </a:p>
-          <a:p>
-            <a:endParaRPr lang="en-US" sz="1000" dirty="0"/>
-          </a:p>
-          <a:p>
-            <a:r>
-              <a:rPr lang="en-US" sz="1000" dirty="0"/>
-              <a:t># Admin identity w/ CIDR limitation</a:t>
-            </a:r>
-          </a:p>
-          <a:p>
-            <a:r>
-              <a:rPr lang="en-US" sz="1000" dirty="0"/>
-              <a:t>- !host</a:t>
-            </a:r>
-          </a:p>
-          <a:p>
-            <a:r>
-              <a:rPr lang="en-US" sz="1000" dirty="0"/>
-              <a:t>  id: appteam1_svc</a:t>
-            </a:r>
-          </a:p>
-          <a:p>
-            <a:r>
-              <a:rPr lang="en-US" sz="1000" dirty="0"/>
-              <a:t>#  </a:t>
-            </a:r>
-            <a:r>
-              <a:rPr lang="en-US" sz="1000" dirty="0" err="1"/>
-              <a:t>restricted_to</a:t>
-            </a:r>
-            <a:r>
-              <a:rPr lang="en-US" sz="1000" dirty="0"/>
-              <a:t>: 172.17.0.3</a:t>
-            </a:r>
-          </a:p>
-          <a:p>
-            <a:endParaRPr lang="en-US" sz="1000" dirty="0"/>
-          </a:p>
-          <a:p>
-            <a:r>
-              <a:rPr lang="en-US" sz="1000" dirty="0"/>
-              <a:t># Create root policy for appteam1</a:t>
-            </a:r>
-          </a:p>
-          <a:p>
-            <a:r>
-              <a:rPr lang="en-US" sz="1000" dirty="0"/>
-              <a:t>- !policy</a:t>
-            </a:r>
-          </a:p>
-          <a:p>
-            <a:r>
-              <a:rPr lang="en-US" sz="1000" dirty="0"/>
-              <a:t>  id: appteam1</a:t>
-            </a:r>
-          </a:p>
-          <a:p>
-            <a:r>
-              <a:rPr lang="en-US" sz="1000" dirty="0"/>
-              <a:t>  owner: !host appteam1_svc</a:t>
-            </a:r>
-          </a:p>
-          <a:p>
-            <a:r>
-              <a:rPr lang="en-US" sz="1000" dirty="0"/>
-              <a:t>  body:</a:t>
-            </a:r>
-          </a:p>
-          <a:p>
-            <a:r>
-              <a:rPr lang="en-US" sz="1000" dirty="0"/>
-              <a:t>  - !group consumers</a:t>
-            </a:r>
-          </a:p>
-          <a:p>
-            <a:endParaRPr lang="en-US" sz="1000" dirty="0"/>
-          </a:p>
-          <a:p>
-            <a:r>
-              <a:rPr lang="en-US" sz="1000" dirty="0"/>
-              <a:t># Grant cross-platform authn to appteam1/consumers role</a:t>
-            </a:r>
-          </a:p>
-          <a:p>
-            <a:r>
-              <a:rPr lang="en-US" sz="1000" dirty="0"/>
-              <a:t>- !grant</a:t>
-            </a:r>
-          </a:p>
-          <a:p>
-            <a:r>
-              <a:rPr lang="en-US" sz="1000" dirty="0"/>
-              <a:t>  roles:</a:t>
-            </a:r>
-          </a:p>
-          <a:p>
-            <a:r>
-              <a:rPr lang="en-US" sz="1000" dirty="0"/>
-              <a:t>  - !group </a:t>
+              <a:t>  # Note 2-space indentation – this is created “under” the </a:t>
             </a:r>
             <a:r>
               <a:rPr lang="en-US" sz="1000" dirty="0" err="1"/>
@@ -13854,110 +13729,231 @@
             </a:r>
             <a:r>
               <a:rPr lang="en-US" sz="1000" dirty="0"/>
-              <a:t>/authn-</a:t>
+              <a:t> policy</a:t>
+            </a:r>
+          </a:p>
+          <a:p>
+            <a:r>
+              <a:rPr lang="en-US" sz="1000" dirty="0"/>
+              <a:t>  # This policy must be bulk-loaded with other root policies.</a:t>
+            </a:r>
+          </a:p>
+          <a:p>
+            <a:r>
+              <a:rPr lang="en-US" sz="1000" dirty="0"/>
+              <a:t>  # Create one policy per authn-</a:t>
             </a:r>
             <a:r>
               <a:rPr lang="en-US" sz="1000" dirty="0" err="1"/>
-              <a:t>iam</a:t>
+              <a:t>oidc</a:t>
             </a:r>
             <a:r>
               <a:rPr lang="en-US" sz="1000" dirty="0"/>
-              <a:t>/lab/consumers</a:t>
+              <a:t> webservice endpoint (usually one per tenant).</a:t>
             </a:r>
           </a:p>
           <a:p>
             <a:r>
               <a:rPr lang="en-US" sz="1000" dirty="0"/>
-              <a:t>  - !group </a:t>
+              <a:t>  # =================================================</a:t>
+            </a:r>
+          </a:p>
+          <a:p>
+            <a:r>
+              <a:rPr lang="en-US" sz="1000" dirty="0"/>
+              <a:t>  </a:t>
+            </a:r>
+          </a:p>
+          <a:p>
+            <a:r>
+              <a:rPr lang="en-US" sz="1000" dirty="0"/>
+              <a:t>  - !policy</a:t>
+            </a:r>
+          </a:p>
+          <a:p>
+            <a:r>
+              <a:rPr lang="en-US" sz="1000" dirty="0"/>
+              <a:t>    id: authn-</a:t>
             </a:r>
             <a:r>
               <a:rPr lang="en-US" sz="1000" dirty="0" err="1"/>
-              <a:t>conjur</a:t>
+              <a:t>oidc</a:t>
             </a:r>
             <a:r>
               <a:rPr lang="en-US" sz="1000" dirty="0"/>
-              <a:t>/authn-azure/lab/consumers</a:t>
+              <a:t>/lab</a:t>
             </a:r>
           </a:p>
           <a:p>
             <a:r>
               <a:rPr lang="en-US" sz="1000" dirty="0"/>
-              <a:t>  - !group </a:t>
+              <a:t>    owner: !host /authn-</a:t>
             </a:r>
             <a:r>
               <a:rPr lang="en-US" sz="1000" dirty="0" err="1"/>
-              <a:t>conjur</a:t>
-            </a:r>
+              <a:t>oidc_svc</a:t>
+            </a:r>
+            <a:endParaRPr lang="en-US" sz="1000" dirty="0"/>
+          </a:p>
+          <a:p>
             <a:r>
               <a:rPr lang="en-US" sz="1000" dirty="0"/>
-              <a:t>/authn-k8s/lab/consumers</a:t>
+              <a:t>    body:</a:t>
             </a:r>
           </a:p>
           <a:p>
             <a:r>
               <a:rPr lang="en-US" sz="1000" dirty="0"/>
-              <a:t>  members:</a:t>
+              <a:t>    - !webservice</a:t>
             </a:r>
           </a:p>
           <a:p>
             <a:r>
               <a:rPr lang="en-US" sz="1000" dirty="0"/>
-              <a:t>  - !group appteam1/consumers</a:t>
-            </a:r>
-          </a:p>
-          <a:p>
+              <a:t>      annotations:</a:t>
+            </a:r>
+          </a:p>
+          <a:p>
+            <a:r>
+              <a:rPr lang="en-US" sz="1000" dirty="0"/>
+              <a:t>        description: Authentication service for 'lab', based on OpenID Connect.</a:t>
+            </a:r>
+          </a:p>
+          <a:p>
+            <a:r>
+              <a:rPr lang="en-US" sz="1000" dirty="0"/>
+              <a:t>    - !variable</a:t>
+            </a:r>
+          </a:p>
+          <a:p>
+            <a:r>
+              <a:rPr lang="en-US" sz="1000" dirty="0"/>
+              <a:t>      id: provider-</a:t>
+            </a:r>
+            <a:r>
+              <a:rPr lang="en-US" sz="1000" dirty="0" err="1"/>
+              <a:t>uri</a:t>
+            </a:r>
             <a:endParaRPr lang="en-US" sz="1000" dirty="0"/>
           </a:p>
           <a:p>
             <a:r>
               <a:rPr lang="en-US" sz="1000" dirty="0"/>
-              <a:t># Give admin identity role to update Synchronizer policy</a:t>
+              <a:t>    - !variable</a:t>
             </a:r>
           </a:p>
           <a:p>
             <a:r>
               <a:rPr lang="en-US" sz="1000" dirty="0"/>
-              <a:t>- !grant</a:t>
+              <a:t>      id: id-token-user-property</a:t>
             </a:r>
           </a:p>
           <a:p>
             <a:r>
               <a:rPr lang="en-US" sz="1000" dirty="0"/>
-              <a:t>  role: !group </a:t>
+              <a:t>    - !group</a:t>
+            </a:r>
+          </a:p>
+          <a:p>
+            <a:r>
+              <a:rPr lang="en-US" sz="1000" dirty="0"/>
+              <a:t>      id: consumers</a:t>
+            </a:r>
+          </a:p>
+          <a:p>
+            <a:r>
+              <a:rPr lang="en-US" sz="1000" dirty="0"/>
+              <a:t>      annotations:</a:t>
+            </a:r>
+          </a:p>
+          <a:p>
+            <a:r>
+              <a:rPr lang="en-US" sz="1000" dirty="0"/>
+              <a:t>        description: Group of users who can authenticate using the authn-</a:t>
             </a:r>
             <a:r>
               <a:rPr lang="en-US" sz="1000" dirty="0" err="1"/>
-              <a:t>LabVault</a:t>
+              <a:t>oidc</a:t>
             </a:r>
             <a:r>
               <a:rPr lang="en-US" sz="1000" dirty="0"/>
-              <a:t>-admins</a:t>
+              <a:t>/'lab' authenticator </a:t>
             </a:r>
           </a:p>
           <a:p>
             <a:r>
               <a:rPr lang="en-US" sz="1000" dirty="0"/>
-              <a:t>  member: !host appteam1_svc</a:t>
-            </a:r>
-          </a:p>
-          <a:p>
-            <a:endParaRPr lang="en-US" sz="1000" dirty="0"/>
+              <a:t>    - !permit</a:t>
+            </a:r>
           </a:p>
           <a:p>
             <a:r>
               <a:rPr lang="en-US" sz="1000" dirty="0"/>
-              <a:t># END APPTEAM1 ROOT</a:t>
-            </a:r>
-          </a:p>
-          <a:p>
-            <a:endParaRPr lang="en-US" sz="1000" dirty="0"/>
+              <a:t>      role: !group consumers</a:t>
+            </a:r>
+          </a:p>
+          <a:p>
+            <a:r>
+              <a:rPr lang="en-US" sz="1000" dirty="0"/>
+              <a:t>      privilege: [ read, authenticate ]</a:t>
+            </a:r>
+          </a:p>
+          <a:p>
+            <a:r>
+              <a:rPr lang="en-US" sz="1000" dirty="0"/>
+              <a:t>      resource: !webservice</a:t>
+            </a:r>
+          </a:p>
+          <a:p>
+            <a:r>
+              <a:rPr lang="en-US" sz="1000" dirty="0"/>
+              <a:t>      </a:t>
+            </a:r>
+          </a:p>
+          <a:p>
+            <a:r>
+              <a:rPr lang="en-US" sz="1000" dirty="0"/>
+              <a:t>  # END AUTHN-OIDC</a:t>
+            </a:r>
+          </a:p>
+        </p:txBody>
+      </p:sp>
+      <p:sp>
+        <p:nvSpPr>
+          <p:cNvPr id="2" name="TextBox 1">
+            <a:extLst>
+              <a:ext uri="{FF2B5EF4-FFF2-40B4-BE49-F238E27FC236}">
+                <a16:creationId xmlns:a16="http://schemas.microsoft.com/office/drawing/2014/main" id="{9237F696-4143-8C45-8959-E00BF972A694}"/>
+              </a:ext>
+            </a:extLst>
+          </p:cNvPr>
+          <p:cNvSpPr txBox="1"/>
+          <p:nvPr/>
+        </p:nvSpPr>
+        <p:spPr>
+          <a:xfrm>
+            <a:off x="3306536" y="6074229"/>
+            <a:ext cx="0" cy="0"/>
+          </a:xfrm>
+          <a:prstGeom prst="rect">
+            <a:avLst/>
+          </a:prstGeom>
+          <a:noFill/>
+        </p:spPr>
+        <p:txBody>
+          <a:bodyPr wrap="none" rtlCol="0">
+            <a:normAutofit fontScale="25000" lnSpcReduction="20000"/>
+          </a:bodyPr>
+          <a:lstStyle/>
+          <a:p>
+            <a:endParaRPr lang="en-US" dirty="0"/>
           </a:p>
         </p:txBody>
       </p:sp>
     </p:spTree>
     <p:extLst>
       <p:ext uri="{BB962C8B-B14F-4D97-AF65-F5344CB8AC3E}">
-        <p14:creationId xmlns:p14="http://schemas.microsoft.com/office/powerpoint/2010/main" val="3285370583"/>
+        <p14:creationId xmlns:p14="http://schemas.microsoft.com/office/powerpoint/2010/main" val="247453693"/>
       </p:ext>
     </p:extLst>
   </p:cSld>
@@ -13998,10 +13994,10 @@
       </p:grpSpPr>
       <p:sp>
         <p:nvSpPr>
-          <p:cNvPr id="2" name="Slide Number Placeholder 1">
+          <p:cNvPr id="4" name="Slide Number Placeholder 3">
             <a:extLst>
               <a:ext uri="{FF2B5EF4-FFF2-40B4-BE49-F238E27FC236}">
-                <a16:creationId xmlns:a16="http://schemas.microsoft.com/office/drawing/2014/main" id="{F9F39FB9-E473-584E-949C-B5EE69323F6E}"/>
+                <a16:creationId xmlns:a16="http://schemas.microsoft.com/office/drawing/2014/main" id="{DA2DA963-B453-8B49-B87E-D10D73997E40}"/>
               </a:ext>
             </a:extLst>
           </p:cNvPr>
@@ -14019,7 +14015,6 @@
           <a:p>
             <a:fld id="{3DB5E446-421A-E746-A83E-D1D14D8D9CBB}" type="slidenum">
               <a:rPr lang="en-US" smtClean="0"/>
-              <a:pPr/>
               <a:t>21</a:t>
             </a:fld>
             <a:endParaRPr lang="en-US"/>
@@ -14028,10 +14023,10 @@
       </p:sp>
       <p:sp>
         <p:nvSpPr>
-          <p:cNvPr id="4" name="Title 3">
+          <p:cNvPr id="5" name="Title 4">
             <a:extLst>
               <a:ext uri="{FF2B5EF4-FFF2-40B4-BE49-F238E27FC236}">
-                <a16:creationId xmlns:a16="http://schemas.microsoft.com/office/drawing/2014/main" id="{5A29DB6D-738F-A74B-86D3-BD7C7DFF1D94}"/>
+                <a16:creationId xmlns:a16="http://schemas.microsoft.com/office/drawing/2014/main" id="{3CA291E2-4C43-4846-AA5A-1C8052DF8AEA}"/>
               </a:ext>
             </a:extLst>
           </p:cNvPr>
@@ -14049,15 +14044,329 @@
           <a:p>
             <a:r>
               <a:rPr lang="en-US" dirty="0"/>
-              <a:t>App identity policies</a:t>
-            </a:r>
+              <a:t>10-Appteam1.yml</a:t>
+            </a:r>
+          </a:p>
+        </p:txBody>
+      </p:sp>
+      <p:sp>
+        <p:nvSpPr>
+          <p:cNvPr id="6" name="TextBox 5">
+            <a:extLst>
+              <a:ext uri="{FF2B5EF4-FFF2-40B4-BE49-F238E27FC236}">
+                <a16:creationId xmlns:a16="http://schemas.microsoft.com/office/drawing/2014/main" id="{447548D3-2201-2847-801D-1F6DD6126392}"/>
+              </a:ext>
+            </a:extLst>
+          </p:cNvPr>
+          <p:cNvSpPr txBox="1"/>
+          <p:nvPr/>
+        </p:nvSpPr>
+        <p:spPr>
+          <a:xfrm>
+            <a:off x="1280160" y="1005839"/>
+            <a:ext cx="9584871" cy="4875977"/>
+          </a:xfrm>
+          <a:prstGeom prst="rect">
+            <a:avLst/>
+          </a:prstGeom>
+          <a:solidFill>
+            <a:schemeClr val="bg1"/>
+          </a:solidFill>
+          <a:ln>
+            <a:solidFill>
+              <a:schemeClr val="accent1"/>
+            </a:solidFill>
+          </a:ln>
+          <a:effectLst>
+            <a:outerShdw blurRad="50800" dist="38100" dir="2700000" algn="tl" rotWithShape="0">
+              <a:prstClr val="black">
+                <a:alpha val="40000"/>
+              </a:prstClr>
+            </a:outerShdw>
+          </a:effectLst>
+        </p:spPr>
+        <p:txBody>
+          <a:bodyPr wrap="square" rtlCol="0">
+            <a:normAutofit fontScale="92500" lnSpcReduction="10000"/>
+          </a:bodyPr>
+          <a:lstStyle>
+            <a:defPPr>
+              <a:defRPr lang="en-US"/>
+            </a:defPPr>
+            <a:lvl1pPr>
+              <a:defRPr>
+                <a:latin typeface="Courier" pitchFamily="2" charset="0"/>
+              </a:defRPr>
+            </a:lvl1pPr>
+          </a:lstStyle>
+          <a:p>
+            <a:r>
+              <a:rPr lang="en-US" sz="1000" dirty="0"/>
+              <a:t>#======================</a:t>
+            </a:r>
+          </a:p>
+          <a:p>
+            <a:r>
+              <a:rPr lang="en-US" sz="1000" dirty="0"/>
+              <a:t># APPTEAM1 ROOT POLICY</a:t>
+            </a:r>
+          </a:p>
+          <a:p>
+            <a:r>
+              <a:rPr lang="en-US" sz="1000" dirty="0"/>
+              <a:t># </a:t>
+            </a:r>
+            <a:r>
+              <a:rPr lang="en-US" sz="1000" dirty="0" err="1"/>
+              <a:t>AppTeam</a:t>
+            </a:r>
+            <a:r>
+              <a:rPr lang="en-US" sz="1000" dirty="0"/>
+              <a:t> Policy Template where policy namespace = EPV safe name</a:t>
+            </a:r>
+          </a:p>
+          <a:p>
+            <a:r>
+              <a:rPr lang="en-US" sz="1000" dirty="0"/>
+              <a:t># Creates admin identity to delegate policy </a:t>
+            </a:r>
+            <a:r>
+              <a:rPr lang="en-US" sz="1000" dirty="0" err="1"/>
+              <a:t>mgmt</a:t>
+            </a:r>
+            <a:r>
+              <a:rPr lang="en-US" sz="1000" dirty="0"/>
+              <a:t> and role to grant authn to app identities.</a:t>
+            </a:r>
+          </a:p>
+          <a:p>
+            <a:r>
+              <a:rPr lang="en-US" sz="1000" dirty="0"/>
+              <a:t># This policy must be bulk-loaded with other root policies.</a:t>
+            </a:r>
+          </a:p>
+          <a:p>
+            <a:r>
+              <a:rPr lang="en-US" sz="1000" dirty="0"/>
+              <a:t># Create one policy for each application team, named for the application team.</a:t>
+            </a:r>
+          </a:p>
+          <a:p>
+            <a:r>
+              <a:rPr lang="en-US" sz="1000" dirty="0"/>
+              <a:t>#======================</a:t>
+            </a:r>
+          </a:p>
+          <a:p>
+            <a:endParaRPr lang="en-US" sz="1000" dirty="0"/>
+          </a:p>
+          <a:p>
+            <a:r>
+              <a:rPr lang="en-US" sz="1000" dirty="0"/>
+              <a:t># Admin identity w/ CIDR limitation</a:t>
+            </a:r>
+          </a:p>
+          <a:p>
+            <a:r>
+              <a:rPr lang="en-US" sz="1000" dirty="0"/>
+              <a:t>- !host</a:t>
+            </a:r>
+          </a:p>
+          <a:p>
+            <a:r>
+              <a:rPr lang="en-US" sz="1000" dirty="0"/>
+              <a:t>  id: appteam1_svc</a:t>
+            </a:r>
+          </a:p>
+          <a:p>
+            <a:r>
+              <a:rPr lang="en-US" sz="1000" dirty="0"/>
+              <a:t>#  </a:t>
+            </a:r>
+            <a:r>
+              <a:rPr lang="en-US" sz="1000" dirty="0" err="1"/>
+              <a:t>restricted_to</a:t>
+            </a:r>
+            <a:r>
+              <a:rPr lang="en-US" sz="1000" dirty="0"/>
+              <a:t>: 172.17.0.3</a:t>
+            </a:r>
+          </a:p>
+          <a:p>
+            <a:endParaRPr lang="en-US" sz="1000" dirty="0"/>
+          </a:p>
+          <a:p>
+            <a:r>
+              <a:rPr lang="en-US" sz="1000" dirty="0"/>
+              <a:t># Create root policy for appteam1</a:t>
+            </a:r>
+          </a:p>
+          <a:p>
+            <a:r>
+              <a:rPr lang="en-US" sz="1000" dirty="0"/>
+              <a:t>- !policy</a:t>
+            </a:r>
+          </a:p>
+          <a:p>
+            <a:r>
+              <a:rPr lang="en-US" sz="1000" dirty="0"/>
+              <a:t>  id: appteam1</a:t>
+            </a:r>
+          </a:p>
+          <a:p>
+            <a:r>
+              <a:rPr lang="en-US" sz="1000" dirty="0"/>
+              <a:t>  owner: !host appteam1_svc</a:t>
+            </a:r>
+          </a:p>
+          <a:p>
+            <a:r>
+              <a:rPr lang="en-US" sz="1000" dirty="0"/>
+              <a:t>  body:</a:t>
+            </a:r>
+          </a:p>
+          <a:p>
+            <a:r>
+              <a:rPr lang="en-US" sz="1000" dirty="0"/>
+              <a:t>  - !group consumers</a:t>
+            </a:r>
+          </a:p>
+          <a:p>
+            <a:endParaRPr lang="en-US" sz="1000" dirty="0"/>
+          </a:p>
+          <a:p>
+            <a:r>
+              <a:rPr lang="en-US" sz="1000" dirty="0"/>
+              <a:t># Grant cross-platform authn to appteam1/consumers role</a:t>
+            </a:r>
+          </a:p>
+          <a:p>
+            <a:r>
+              <a:rPr lang="en-US" sz="1000" dirty="0"/>
+              <a:t>- !grant</a:t>
+            </a:r>
+          </a:p>
+          <a:p>
+            <a:r>
+              <a:rPr lang="en-US" sz="1000" dirty="0"/>
+              <a:t>  roles:</a:t>
+            </a:r>
+          </a:p>
+          <a:p>
+            <a:r>
+              <a:rPr lang="en-US" sz="1000" dirty="0"/>
+              <a:t>  - !group </a:t>
+            </a:r>
+            <a:r>
+              <a:rPr lang="en-US" sz="1000" dirty="0" err="1"/>
+              <a:t>conjur</a:t>
+            </a:r>
+            <a:r>
+              <a:rPr lang="en-US" sz="1000" dirty="0"/>
+              <a:t>/authn-</a:t>
+            </a:r>
+            <a:r>
+              <a:rPr lang="en-US" sz="1000" dirty="0" err="1"/>
+              <a:t>iam</a:t>
+            </a:r>
+            <a:r>
+              <a:rPr lang="en-US" sz="1000" dirty="0"/>
+              <a:t>/lab/consumers</a:t>
+            </a:r>
+          </a:p>
+          <a:p>
+            <a:r>
+              <a:rPr lang="en-US" sz="1000" dirty="0"/>
+              <a:t>  - !group </a:t>
+            </a:r>
+            <a:r>
+              <a:rPr lang="en-US" sz="1000" dirty="0" err="1"/>
+              <a:t>conjur</a:t>
+            </a:r>
+            <a:r>
+              <a:rPr lang="en-US" sz="1000" dirty="0"/>
+              <a:t>/authn-azure/lab/consumers</a:t>
+            </a:r>
+          </a:p>
+          <a:p>
+            <a:r>
+              <a:rPr lang="en-US" sz="1000" dirty="0"/>
+              <a:t>  - !group </a:t>
+            </a:r>
+            <a:r>
+              <a:rPr lang="en-US" sz="1000" dirty="0" err="1"/>
+              <a:t>conjur</a:t>
+            </a:r>
+            <a:r>
+              <a:rPr lang="en-US" sz="1000" dirty="0"/>
+              <a:t>/authn-k8s/lab/consumers</a:t>
+            </a:r>
+          </a:p>
+          <a:p>
+            <a:r>
+              <a:rPr lang="en-US" sz="1000" dirty="0"/>
+              <a:t>  members:</a:t>
+            </a:r>
+          </a:p>
+          <a:p>
+            <a:r>
+              <a:rPr lang="en-US" sz="1000" dirty="0"/>
+              <a:t>  - !group appteam1/consumers</a:t>
+            </a:r>
+          </a:p>
+          <a:p>
+            <a:endParaRPr lang="en-US" sz="1000" dirty="0"/>
+          </a:p>
+          <a:p>
+            <a:r>
+              <a:rPr lang="en-US" sz="1000" dirty="0"/>
+              <a:t># Give admin identity role to update Synchronizer policy</a:t>
+            </a:r>
+          </a:p>
+          <a:p>
+            <a:r>
+              <a:rPr lang="en-US" sz="1000" dirty="0"/>
+              <a:t>- !grant</a:t>
+            </a:r>
+          </a:p>
+          <a:p>
+            <a:r>
+              <a:rPr lang="en-US" sz="1000" dirty="0"/>
+              <a:t>  role: !group </a:t>
+            </a:r>
+            <a:r>
+              <a:rPr lang="en-US" sz="1000" dirty="0" err="1"/>
+              <a:t>LabVault</a:t>
+            </a:r>
+            <a:r>
+              <a:rPr lang="en-US" sz="1000" dirty="0"/>
+              <a:t>-admins</a:t>
+            </a:r>
+          </a:p>
+          <a:p>
+            <a:r>
+              <a:rPr lang="en-US" sz="1000" dirty="0"/>
+              <a:t>  member: !host appteam1_svc</a:t>
+            </a:r>
+          </a:p>
+          <a:p>
+            <a:endParaRPr lang="en-US" sz="1000" dirty="0"/>
+          </a:p>
+          <a:p>
+            <a:r>
+              <a:rPr lang="en-US" sz="1000" dirty="0"/>
+              <a:t># END APPTEAM1 ROOT</a:t>
+            </a:r>
+          </a:p>
+          <a:p>
+            <a:endParaRPr lang="en-US" sz="1000" dirty="0"/>
           </a:p>
         </p:txBody>
       </p:sp>
     </p:spTree>
     <p:extLst>
       <p:ext uri="{BB962C8B-B14F-4D97-AF65-F5344CB8AC3E}">
-        <p14:creationId xmlns:p14="http://schemas.microsoft.com/office/powerpoint/2010/main" val="2455758476"/>
+        <p14:creationId xmlns:p14="http://schemas.microsoft.com/office/powerpoint/2010/main" val="3285370583"/>
       </p:ext>
     </p:extLst>
   </p:cSld>
@@ -14098,10 +14407,10 @@
       </p:grpSpPr>
       <p:sp>
         <p:nvSpPr>
-          <p:cNvPr id="4" name="Slide Number Placeholder 3">
+          <p:cNvPr id="2" name="Slide Number Placeholder 1">
             <a:extLst>
               <a:ext uri="{FF2B5EF4-FFF2-40B4-BE49-F238E27FC236}">
-                <a16:creationId xmlns:a16="http://schemas.microsoft.com/office/drawing/2014/main" id="{DA2DA963-B453-8B49-B87E-D10D73997E40}"/>
+                <a16:creationId xmlns:a16="http://schemas.microsoft.com/office/drawing/2014/main" id="{F9F39FB9-E473-584E-949C-B5EE69323F6E}"/>
               </a:ext>
             </a:extLst>
           </p:cNvPr>
@@ -14119,6 +14428,7 @@
           <a:p>
             <a:fld id="{3DB5E446-421A-E746-A83E-D1D14D8D9CBB}" type="slidenum">
               <a:rPr lang="en-US" smtClean="0"/>
+              <a:pPr/>
               <a:t>22</a:t>
             </a:fld>
             <a:endParaRPr lang="en-US"/>
@@ -14127,10 +14437,10 @@
       </p:sp>
       <p:sp>
         <p:nvSpPr>
-          <p:cNvPr id="5" name="Title 4">
+          <p:cNvPr id="4" name="Title 3">
             <a:extLst>
               <a:ext uri="{FF2B5EF4-FFF2-40B4-BE49-F238E27FC236}">
-                <a16:creationId xmlns:a16="http://schemas.microsoft.com/office/drawing/2014/main" id="{3CA291E2-4C43-4846-AA5A-1C8052DF8AEA}"/>
+                <a16:creationId xmlns:a16="http://schemas.microsoft.com/office/drawing/2014/main" id="{5A29DB6D-738F-A74B-86D3-BD7C7DFF1D94}"/>
               </a:ext>
             </a:extLst>
           </p:cNvPr>
@@ -14148,301 +14458,15 @@
           <a:p>
             <a:r>
               <a:rPr lang="en-US" dirty="0"/>
-              <a:t>Appteam1-identities.yml</a:t>
-            </a:r>
-          </a:p>
-        </p:txBody>
-      </p:sp>
-      <p:sp>
-        <p:nvSpPr>
-          <p:cNvPr id="6" name="TextBox 5">
-            <a:extLst>
-              <a:ext uri="{FF2B5EF4-FFF2-40B4-BE49-F238E27FC236}">
-                <a16:creationId xmlns:a16="http://schemas.microsoft.com/office/drawing/2014/main" id="{447548D3-2201-2847-801D-1F6DD6126392}"/>
-              </a:ext>
-            </a:extLst>
-          </p:cNvPr>
-          <p:cNvSpPr txBox="1"/>
-          <p:nvPr/>
-        </p:nvSpPr>
-        <p:spPr>
-          <a:xfrm>
-            <a:off x="1295400" y="1021742"/>
-            <a:ext cx="9601200" cy="4365803"/>
-          </a:xfrm>
-          <a:prstGeom prst="rect">
-            <a:avLst/>
-          </a:prstGeom>
-          <a:solidFill>
-            <a:schemeClr val="bg1"/>
-          </a:solidFill>
-          <a:ln>
-            <a:solidFill>
-              <a:schemeClr val="accent1"/>
-            </a:solidFill>
-          </a:ln>
-          <a:effectLst>
-            <a:outerShdw blurRad="50800" dist="38100" dir="2700000" algn="tl" rotWithShape="0">
-              <a:prstClr val="black">
-                <a:alpha val="40000"/>
-              </a:prstClr>
-            </a:outerShdw>
-          </a:effectLst>
-        </p:spPr>
-        <p:txBody>
-          <a:bodyPr wrap="square" rtlCol="0">
-            <a:normAutofit fontScale="92500" lnSpcReduction="10000"/>
-          </a:bodyPr>
-          <a:lstStyle/>
-          <a:p>
-            <a:r>
-              <a:rPr lang="en-US" sz="1050" dirty="0">
-                <a:latin typeface="Courier" pitchFamily="2" charset="0"/>
-              </a:rPr>
-              <a:t>#======================</a:t>
-            </a:r>
-          </a:p>
-          <a:p>
-            <a:r>
-              <a:rPr lang="en-US" sz="1050" dirty="0">
-                <a:latin typeface="Courier" pitchFamily="2" charset="0"/>
-              </a:rPr>
-              <a:t># APPTEAM1 IDENTITIES</a:t>
-            </a:r>
-          </a:p>
-          <a:p>
-            <a:r>
-              <a:rPr lang="en-US" sz="1050" dirty="0">
-                <a:latin typeface="Courier" pitchFamily="2" charset="0"/>
-              </a:rPr>
-              <a:t># Policy defined &amp; managed by application team.</a:t>
-            </a:r>
-          </a:p>
-          <a:p>
-            <a:r>
-              <a:rPr lang="en-US" sz="1050" dirty="0">
-                <a:latin typeface="Courier" pitchFamily="2" charset="0"/>
-              </a:rPr>
-              <a:t># Defines application identities “under” the app team’s root policy.</a:t>
-            </a:r>
-          </a:p>
-          <a:p>
-            <a:r>
-              <a:rPr lang="en-US" sz="1050" dirty="0">
-                <a:latin typeface="Courier" pitchFamily="2" charset="0"/>
-              </a:rPr>
-              <a:t># Applied w/ --replace using the appteam1_svc service account</a:t>
-            </a:r>
-          </a:p>
-          <a:p>
-            <a:r>
-              <a:rPr lang="en-US" sz="1050" dirty="0">
-                <a:latin typeface="Courier" pitchFamily="2" charset="0"/>
-              </a:rPr>
-              <a:t>#======================</a:t>
-            </a:r>
-          </a:p>
-          <a:p>
-            <a:endParaRPr lang="en-US" sz="1050" dirty="0">
-              <a:latin typeface="Courier" pitchFamily="2" charset="0"/>
-            </a:endParaRPr>
-          </a:p>
-          <a:p>
-            <a:r>
-              <a:rPr lang="en-US" sz="1050" dirty="0">
-                <a:latin typeface="Courier" pitchFamily="2" charset="0"/>
-              </a:rPr>
-              <a:t>  - &amp;hosts</a:t>
-            </a:r>
-          </a:p>
-          <a:p>
-            <a:r>
-              <a:rPr lang="en-US" sz="1050" dirty="0">
-                <a:latin typeface="Courier" pitchFamily="2" charset="0"/>
-              </a:rPr>
-              <a:t>    - !host </a:t>
-            </a:r>
-            <a:r>
-              <a:rPr lang="en-US" sz="1050" dirty="0" err="1">
-                <a:latin typeface="Courier" pitchFamily="2" charset="0"/>
-              </a:rPr>
-              <a:t>aws</a:t>
-            </a:r>
-            <a:r>
-              <a:rPr lang="en-US" sz="1050" dirty="0">
-                <a:latin typeface="Courier" pitchFamily="2" charset="0"/>
-              </a:rPr>
-              <a:t>-app/475601244925/</a:t>
-            </a:r>
-            <a:r>
-              <a:rPr lang="en-US" sz="1050" dirty="0" err="1">
-                <a:latin typeface="Courier" pitchFamily="2" charset="0"/>
-              </a:rPr>
-              <a:t>GenericReadOnly</a:t>
-            </a:r>
-            <a:endParaRPr lang="en-US" sz="1050" dirty="0">
-              <a:latin typeface="Courier" pitchFamily="2" charset="0"/>
-            </a:endParaRPr>
-          </a:p>
-          <a:p>
-            <a:endParaRPr lang="en-US" sz="1050" dirty="0">
-              <a:latin typeface="Courier" pitchFamily="2" charset="0"/>
-            </a:endParaRPr>
-          </a:p>
-          <a:p>
-            <a:r>
-              <a:rPr lang="en-US" sz="1050" dirty="0">
-                <a:latin typeface="Courier" pitchFamily="2" charset="0"/>
-              </a:rPr>
-              <a:t>    - !host</a:t>
-            </a:r>
-          </a:p>
-          <a:p>
-            <a:r>
-              <a:rPr lang="en-US" sz="1050" dirty="0">
-                <a:latin typeface="Courier" pitchFamily="2" charset="0"/>
-              </a:rPr>
-              <a:t>      id: azure-app</a:t>
-            </a:r>
-          </a:p>
-          <a:p>
-            <a:r>
-              <a:rPr lang="en-US" sz="1050" dirty="0">
-                <a:latin typeface="Courier" pitchFamily="2" charset="0"/>
-              </a:rPr>
-              <a:t>      annotations:</a:t>
-            </a:r>
-          </a:p>
-          <a:p>
-            <a:r>
-              <a:rPr lang="en-US" sz="1050" dirty="0">
-                <a:latin typeface="Courier" pitchFamily="2" charset="0"/>
-              </a:rPr>
-              <a:t>        authn-azure/subscription-id: a01ff134-ae78-4497-b11c-7a698736b8a0</a:t>
-            </a:r>
-          </a:p>
-          <a:p>
-            <a:r>
-              <a:rPr lang="en-US" sz="1050" dirty="0">
-                <a:latin typeface="Courier" pitchFamily="2" charset="0"/>
-              </a:rPr>
-              <a:t>        authn-azure/resource-group: appteam1</a:t>
-            </a:r>
-          </a:p>
-          <a:p>
-            <a:r>
-              <a:rPr lang="en-US" sz="1050" dirty="0">
-                <a:latin typeface="Courier" pitchFamily="2" charset="0"/>
-              </a:rPr>
-              <a:t>        authn-azure/user-assigned-identity: appteam1-UA-Identity</a:t>
-            </a:r>
-          </a:p>
-          <a:p>
-            <a:endParaRPr lang="en-US" sz="1050" dirty="0">
-              <a:latin typeface="Courier" pitchFamily="2" charset="0"/>
-            </a:endParaRPr>
-          </a:p>
-          <a:p>
-            <a:r>
-              <a:rPr lang="en-US" sz="1050" dirty="0">
-                <a:latin typeface="Courier" pitchFamily="2" charset="0"/>
-              </a:rPr>
-              <a:t>    - !host</a:t>
-            </a:r>
-          </a:p>
-          <a:p>
-            <a:r>
-              <a:rPr lang="en-US" sz="1050" dirty="0">
-                <a:latin typeface="Courier" pitchFamily="2" charset="0"/>
-              </a:rPr>
-              <a:t>      id: k8s-app</a:t>
-            </a:r>
-          </a:p>
-          <a:p>
-            <a:r>
-              <a:rPr lang="en-US" sz="1050" dirty="0">
-                <a:latin typeface="Courier" pitchFamily="2" charset="0"/>
-              </a:rPr>
-              <a:t>      annotations:</a:t>
-            </a:r>
-          </a:p>
-          <a:p>
-            <a:r>
-              <a:rPr lang="en-US" sz="1050" dirty="0">
-                <a:latin typeface="Courier" pitchFamily="2" charset="0"/>
-              </a:rPr>
-              <a:t>        authn-k8s/namespace: appteam1</a:t>
-            </a:r>
-          </a:p>
-          <a:p>
-            <a:r>
-              <a:rPr lang="en-US" sz="1050" dirty="0">
-                <a:latin typeface="Courier" pitchFamily="2" charset="0"/>
-              </a:rPr>
-              <a:t>        authn-k8s/service-account: appteam1-app1</a:t>
-            </a:r>
-          </a:p>
-          <a:p>
-            <a:r>
-              <a:rPr lang="en-US" sz="1050" dirty="0">
-                <a:latin typeface="Courier" pitchFamily="2" charset="0"/>
-              </a:rPr>
-              <a:t>        authn-k8s/authentication-container-name: authenticator</a:t>
-            </a:r>
-          </a:p>
-          <a:p>
-            <a:endParaRPr lang="en-US" sz="1050" dirty="0">
-              <a:latin typeface="Courier" pitchFamily="2" charset="0"/>
-            </a:endParaRPr>
-          </a:p>
-          <a:p>
-            <a:r>
-              <a:rPr lang="en-US" sz="1050" dirty="0">
-                <a:latin typeface="Courier" pitchFamily="2" charset="0"/>
-              </a:rPr>
-              <a:t>  - !grant</a:t>
-            </a:r>
-          </a:p>
-          <a:p>
-            <a:r>
-              <a:rPr lang="en-US" sz="1050" dirty="0">
-                <a:latin typeface="Courier" pitchFamily="2" charset="0"/>
-              </a:rPr>
-              <a:t>    role: !group consumers</a:t>
-            </a:r>
-          </a:p>
-          <a:p>
-            <a:r>
-              <a:rPr lang="en-US" sz="1050" dirty="0">
-                <a:latin typeface="Courier" pitchFamily="2" charset="0"/>
-              </a:rPr>
-              <a:t>    members: *hosts</a:t>
-            </a:r>
-          </a:p>
-          <a:p>
-            <a:endParaRPr lang="en-US" sz="1050" dirty="0">
-              <a:latin typeface="Courier" pitchFamily="2" charset="0"/>
-            </a:endParaRPr>
-          </a:p>
-          <a:p>
-            <a:r>
-              <a:rPr lang="en-US" sz="1050" dirty="0">
-                <a:latin typeface="Courier" pitchFamily="2" charset="0"/>
-              </a:rPr>
-              <a:t># END APPTEAM1 IDENTITIES</a:t>
-            </a:r>
-          </a:p>
-          <a:p>
-            <a:endParaRPr lang="en-US" sz="1050" dirty="0">
-              <a:latin typeface="Courier" pitchFamily="2" charset="0"/>
-            </a:endParaRPr>
+              <a:t>App identity policies</a:t>
+            </a:r>
           </a:p>
         </p:txBody>
       </p:sp>
     </p:spTree>
     <p:extLst>
       <p:ext uri="{BB962C8B-B14F-4D97-AF65-F5344CB8AC3E}">
-        <p14:creationId xmlns:p14="http://schemas.microsoft.com/office/powerpoint/2010/main" val="402118830"/>
+        <p14:creationId xmlns:p14="http://schemas.microsoft.com/office/powerpoint/2010/main" val="2455758476"/>
       </p:ext>
     </p:extLst>
   </p:cSld>
@@ -14483,10 +14507,10 @@
       </p:grpSpPr>
       <p:sp>
         <p:nvSpPr>
-          <p:cNvPr id="2" name="Slide Number Placeholder 1">
+          <p:cNvPr id="4" name="Slide Number Placeholder 3">
             <a:extLst>
               <a:ext uri="{FF2B5EF4-FFF2-40B4-BE49-F238E27FC236}">
-                <a16:creationId xmlns:a16="http://schemas.microsoft.com/office/drawing/2014/main" id="{EF31DE12-07EE-4D4F-9B5D-1285FDDAA155}"/>
+                <a16:creationId xmlns:a16="http://schemas.microsoft.com/office/drawing/2014/main" id="{DA2DA963-B453-8B49-B87E-D10D73997E40}"/>
               </a:ext>
             </a:extLst>
           </p:cNvPr>
@@ -14504,7 +14528,6 @@
           <a:p>
             <a:fld id="{3DB5E446-421A-E746-A83E-D1D14D8D9CBB}" type="slidenum">
               <a:rPr lang="en-US" smtClean="0"/>
-              <a:pPr/>
               <a:t>23</a:t>
             </a:fld>
             <a:endParaRPr lang="en-US"/>
@@ -14513,10 +14536,10 @@
       </p:sp>
       <p:sp>
         <p:nvSpPr>
-          <p:cNvPr id="4" name="Title 3">
+          <p:cNvPr id="5" name="Title 4">
             <a:extLst>
               <a:ext uri="{FF2B5EF4-FFF2-40B4-BE49-F238E27FC236}">
-                <a16:creationId xmlns:a16="http://schemas.microsoft.com/office/drawing/2014/main" id="{ACA48675-F0BC-DB44-BAAA-EA52A7D4782D}"/>
+                <a16:creationId xmlns:a16="http://schemas.microsoft.com/office/drawing/2014/main" id="{3CA291E2-4C43-4846-AA5A-1C8052DF8AEA}"/>
               </a:ext>
             </a:extLst>
           </p:cNvPr>
@@ -14533,20 +14556,302 @@
           <a:lstStyle/>
           <a:p>
             <a:r>
-              <a:rPr lang="en-US" dirty="0" err="1"/>
-              <a:t>Misc</a:t>
-            </a:r>
-            <a:r>
               <a:rPr lang="en-US" dirty="0"/>
-              <a:t> policies</a:t>
-            </a:r>
+              <a:t>Appteam1-identities.yml</a:t>
+            </a:r>
+          </a:p>
+        </p:txBody>
+      </p:sp>
+      <p:sp>
+        <p:nvSpPr>
+          <p:cNvPr id="6" name="TextBox 5">
+            <a:extLst>
+              <a:ext uri="{FF2B5EF4-FFF2-40B4-BE49-F238E27FC236}">
+                <a16:creationId xmlns:a16="http://schemas.microsoft.com/office/drawing/2014/main" id="{447548D3-2201-2847-801D-1F6DD6126392}"/>
+              </a:ext>
+            </a:extLst>
+          </p:cNvPr>
+          <p:cNvSpPr txBox="1"/>
+          <p:nvPr/>
+        </p:nvSpPr>
+        <p:spPr>
+          <a:xfrm>
+            <a:off x="1295400" y="1021742"/>
+            <a:ext cx="9601200" cy="4365803"/>
+          </a:xfrm>
+          <a:prstGeom prst="rect">
+            <a:avLst/>
+          </a:prstGeom>
+          <a:solidFill>
+            <a:schemeClr val="bg1"/>
+          </a:solidFill>
+          <a:ln>
+            <a:solidFill>
+              <a:schemeClr val="accent1"/>
+            </a:solidFill>
+          </a:ln>
+          <a:effectLst>
+            <a:outerShdw blurRad="50800" dist="38100" dir="2700000" algn="tl" rotWithShape="0">
+              <a:prstClr val="black">
+                <a:alpha val="40000"/>
+              </a:prstClr>
+            </a:outerShdw>
+          </a:effectLst>
+        </p:spPr>
+        <p:txBody>
+          <a:bodyPr wrap="square" rtlCol="0">
+            <a:normAutofit fontScale="92500" lnSpcReduction="10000"/>
+          </a:bodyPr>
+          <a:lstStyle/>
+          <a:p>
+            <a:r>
+              <a:rPr lang="en-US" sz="1050" dirty="0">
+                <a:latin typeface="Courier" pitchFamily="2" charset="0"/>
+              </a:rPr>
+              <a:t>#======================</a:t>
+            </a:r>
+          </a:p>
+          <a:p>
+            <a:r>
+              <a:rPr lang="en-US" sz="1050" dirty="0">
+                <a:latin typeface="Courier" pitchFamily="2" charset="0"/>
+              </a:rPr>
+              <a:t># APPTEAM1 IDENTITIES</a:t>
+            </a:r>
+          </a:p>
+          <a:p>
+            <a:r>
+              <a:rPr lang="en-US" sz="1050" dirty="0">
+                <a:latin typeface="Courier" pitchFamily="2" charset="0"/>
+              </a:rPr>
+              <a:t># Policy defined &amp; managed by application team.</a:t>
+            </a:r>
+          </a:p>
+          <a:p>
+            <a:r>
+              <a:rPr lang="en-US" sz="1050" dirty="0">
+                <a:latin typeface="Courier" pitchFamily="2" charset="0"/>
+              </a:rPr>
+              <a:t># Defines application identities “under” the app team’s root policy.</a:t>
+            </a:r>
+          </a:p>
+          <a:p>
+            <a:r>
+              <a:rPr lang="en-US" sz="1050" dirty="0">
+                <a:latin typeface="Courier" pitchFamily="2" charset="0"/>
+              </a:rPr>
+              <a:t># Applied w/ --replace using the appteam1_svc service account</a:t>
+            </a:r>
+          </a:p>
+          <a:p>
+            <a:r>
+              <a:rPr lang="en-US" sz="1050" dirty="0">
+                <a:latin typeface="Courier" pitchFamily="2" charset="0"/>
+              </a:rPr>
+              <a:t>#======================</a:t>
+            </a:r>
+          </a:p>
+          <a:p>
+            <a:endParaRPr lang="en-US" sz="1050" dirty="0">
+              <a:latin typeface="Courier" pitchFamily="2" charset="0"/>
+            </a:endParaRPr>
+          </a:p>
+          <a:p>
+            <a:r>
+              <a:rPr lang="en-US" sz="1050" dirty="0">
+                <a:latin typeface="Courier" pitchFamily="2" charset="0"/>
+              </a:rPr>
+              <a:t>  - &amp;hosts</a:t>
+            </a:r>
+          </a:p>
+          <a:p>
+            <a:r>
+              <a:rPr lang="en-US" sz="1050" dirty="0">
+                <a:latin typeface="Courier" pitchFamily="2" charset="0"/>
+              </a:rPr>
+              <a:t>    - !host </a:t>
+            </a:r>
+            <a:r>
+              <a:rPr lang="en-US" sz="1050" dirty="0" err="1">
+                <a:latin typeface="Courier" pitchFamily="2" charset="0"/>
+              </a:rPr>
+              <a:t>aws</a:t>
+            </a:r>
+            <a:r>
+              <a:rPr lang="en-US" sz="1050" dirty="0">
+                <a:latin typeface="Courier" pitchFamily="2" charset="0"/>
+              </a:rPr>
+              <a:t>-app/475601244925/</a:t>
+            </a:r>
+            <a:r>
+              <a:rPr lang="en-US" sz="1050" dirty="0" err="1">
+                <a:latin typeface="Courier" pitchFamily="2" charset="0"/>
+              </a:rPr>
+              <a:t>GenericReadOnly</a:t>
+            </a:r>
+            <a:endParaRPr lang="en-US" sz="1050" dirty="0">
+              <a:latin typeface="Courier" pitchFamily="2" charset="0"/>
+            </a:endParaRPr>
+          </a:p>
+          <a:p>
+            <a:endParaRPr lang="en-US" sz="1050" dirty="0">
+              <a:latin typeface="Courier" pitchFamily="2" charset="0"/>
+            </a:endParaRPr>
+          </a:p>
+          <a:p>
+            <a:r>
+              <a:rPr lang="en-US" sz="1050" dirty="0">
+                <a:latin typeface="Courier" pitchFamily="2" charset="0"/>
+              </a:rPr>
+              <a:t>    - !host</a:t>
+            </a:r>
+          </a:p>
+          <a:p>
+            <a:r>
+              <a:rPr lang="en-US" sz="1050" dirty="0">
+                <a:latin typeface="Courier" pitchFamily="2" charset="0"/>
+              </a:rPr>
+              <a:t>      id: azure-app</a:t>
+            </a:r>
+          </a:p>
+          <a:p>
+            <a:r>
+              <a:rPr lang="en-US" sz="1050" dirty="0">
+                <a:latin typeface="Courier" pitchFamily="2" charset="0"/>
+              </a:rPr>
+              <a:t>      annotations:</a:t>
+            </a:r>
+          </a:p>
+          <a:p>
+            <a:r>
+              <a:rPr lang="en-US" sz="1050" dirty="0">
+                <a:latin typeface="Courier" pitchFamily="2" charset="0"/>
+              </a:rPr>
+              <a:t>        authn-azure/subscription-id: a01ff134-ae78-4497-b11c-7a698736b8a0</a:t>
+            </a:r>
+          </a:p>
+          <a:p>
+            <a:r>
+              <a:rPr lang="en-US" sz="1050" dirty="0">
+                <a:latin typeface="Courier" pitchFamily="2" charset="0"/>
+              </a:rPr>
+              <a:t>        authn-azure/resource-group: appteam1</a:t>
+            </a:r>
+          </a:p>
+          <a:p>
+            <a:r>
+              <a:rPr lang="en-US" sz="1050" dirty="0">
+                <a:latin typeface="Courier" pitchFamily="2" charset="0"/>
+              </a:rPr>
+              <a:t>        authn-azure/user-assigned-identity: appteam1-UA-Identity</a:t>
+            </a:r>
+          </a:p>
+          <a:p>
+            <a:endParaRPr lang="en-US" sz="1050" dirty="0">
+              <a:latin typeface="Courier" pitchFamily="2" charset="0"/>
+            </a:endParaRPr>
+          </a:p>
+          <a:p>
+            <a:r>
+              <a:rPr lang="en-US" sz="1050" dirty="0">
+                <a:latin typeface="Courier" pitchFamily="2" charset="0"/>
+              </a:rPr>
+              <a:t>    - !host</a:t>
+            </a:r>
+          </a:p>
+          <a:p>
+            <a:r>
+              <a:rPr lang="en-US" sz="1050" dirty="0">
+                <a:latin typeface="Courier" pitchFamily="2" charset="0"/>
+              </a:rPr>
+              <a:t>      id: k8s-app</a:t>
+            </a:r>
+          </a:p>
+          <a:p>
+            <a:r>
+              <a:rPr lang="en-US" sz="1050" dirty="0">
+                <a:latin typeface="Courier" pitchFamily="2" charset="0"/>
+              </a:rPr>
+              <a:t>      annotations:</a:t>
+            </a:r>
+          </a:p>
+          <a:p>
+            <a:r>
+              <a:rPr lang="en-US" sz="1050" dirty="0">
+                <a:latin typeface="Courier" pitchFamily="2" charset="0"/>
+              </a:rPr>
+              <a:t>        authn-k8s/namespace: appteam1</a:t>
+            </a:r>
+          </a:p>
+          <a:p>
+            <a:r>
+              <a:rPr lang="en-US" sz="1050" dirty="0">
+                <a:latin typeface="Courier" pitchFamily="2" charset="0"/>
+              </a:rPr>
+              <a:t>        authn-k8s/service-account: appteam1-app1</a:t>
+            </a:r>
+          </a:p>
+          <a:p>
+            <a:r>
+              <a:rPr lang="en-US" sz="1050" dirty="0">
+                <a:latin typeface="Courier" pitchFamily="2" charset="0"/>
+              </a:rPr>
+              <a:t>        authn-k8s/authentication-container-name: authenticator</a:t>
+            </a:r>
+          </a:p>
+          <a:p>
+            <a:endParaRPr lang="en-US" sz="1050" dirty="0">
+              <a:latin typeface="Courier" pitchFamily="2" charset="0"/>
+            </a:endParaRPr>
+          </a:p>
+          <a:p>
+            <a:r>
+              <a:rPr lang="en-US" sz="1050" dirty="0">
+                <a:latin typeface="Courier" pitchFamily="2" charset="0"/>
+              </a:rPr>
+              <a:t>  - !grant</a:t>
+            </a:r>
+          </a:p>
+          <a:p>
+            <a:r>
+              <a:rPr lang="en-US" sz="1050" dirty="0">
+                <a:latin typeface="Courier" pitchFamily="2" charset="0"/>
+              </a:rPr>
+              <a:t>    role: !group consumers</a:t>
+            </a:r>
+          </a:p>
+          <a:p>
+            <a:r>
+              <a:rPr lang="en-US" sz="1050" dirty="0">
+                <a:latin typeface="Courier" pitchFamily="2" charset="0"/>
+              </a:rPr>
+              <a:t>    members: *hosts</a:t>
+            </a:r>
+          </a:p>
+          <a:p>
+            <a:endParaRPr lang="en-US" sz="1050" dirty="0">
+              <a:latin typeface="Courier" pitchFamily="2" charset="0"/>
+            </a:endParaRPr>
+          </a:p>
+          <a:p>
+            <a:r>
+              <a:rPr lang="en-US" sz="1050" dirty="0">
+                <a:latin typeface="Courier" pitchFamily="2" charset="0"/>
+              </a:rPr>
+              <a:t># END APPTEAM1 IDENTITIES</a:t>
+            </a:r>
+          </a:p>
+          <a:p>
+            <a:endParaRPr lang="en-US" sz="1050" dirty="0">
+              <a:latin typeface="Courier" pitchFamily="2" charset="0"/>
+            </a:endParaRPr>
           </a:p>
         </p:txBody>
       </p:sp>
     </p:spTree>
     <p:extLst>
       <p:ext uri="{BB962C8B-B14F-4D97-AF65-F5344CB8AC3E}">
-        <p14:creationId xmlns:p14="http://schemas.microsoft.com/office/powerpoint/2010/main" val="1843312914"/>
+        <p14:creationId xmlns:p14="http://schemas.microsoft.com/office/powerpoint/2010/main" val="402118830"/>
       </p:ext>
     </p:extLst>
   </p:cSld>
@@ -14587,10 +14892,10 @@
       </p:grpSpPr>
       <p:sp>
         <p:nvSpPr>
-          <p:cNvPr id="4" name="Slide Number Placeholder 3">
+          <p:cNvPr id="2" name="Slide Number Placeholder 1">
             <a:extLst>
               <a:ext uri="{FF2B5EF4-FFF2-40B4-BE49-F238E27FC236}">
-                <a16:creationId xmlns:a16="http://schemas.microsoft.com/office/drawing/2014/main" id="{DA2DA963-B453-8B49-B87E-D10D73997E40}"/>
+                <a16:creationId xmlns:a16="http://schemas.microsoft.com/office/drawing/2014/main" id="{EF31DE12-07EE-4D4F-9B5D-1285FDDAA155}"/>
               </a:ext>
             </a:extLst>
           </p:cNvPr>
@@ -14617,10 +14922,10 @@
       </p:sp>
       <p:sp>
         <p:nvSpPr>
-          <p:cNvPr id="5" name="Title 4">
+          <p:cNvPr id="4" name="Title 3">
             <a:extLst>
               <a:ext uri="{FF2B5EF4-FFF2-40B4-BE49-F238E27FC236}">
-                <a16:creationId xmlns:a16="http://schemas.microsoft.com/office/drawing/2014/main" id="{3CA291E2-4C43-4846-AA5A-1C8052DF8AEA}"/>
+                <a16:creationId xmlns:a16="http://schemas.microsoft.com/office/drawing/2014/main" id="{ACA48675-F0BC-DB44-BAAA-EA52A7D4782D}"/>
               </a:ext>
             </a:extLst>
           </p:cNvPr>
@@ -14637,439 +14942,20 @@
           <a:lstStyle/>
           <a:p>
             <a:r>
+              <a:rPr lang="en-US" dirty="0" err="1"/>
+              <a:t>Misc</a:t>
+            </a:r>
+            <a:r>
               <a:rPr lang="en-US" dirty="0"/>
-              <a:t>Appteam1-SYNc-primer.yml</a:t>
-            </a:r>
-          </a:p>
-        </p:txBody>
-      </p:sp>
-      <p:sp>
-        <p:nvSpPr>
-          <p:cNvPr id="6" name="TextBox 5">
-            <a:extLst>
-              <a:ext uri="{FF2B5EF4-FFF2-40B4-BE49-F238E27FC236}">
-                <a16:creationId xmlns:a16="http://schemas.microsoft.com/office/drawing/2014/main" id="{447548D3-2201-2847-801D-1F6DD6126392}"/>
-              </a:ext>
-            </a:extLst>
-          </p:cNvPr>
-          <p:cNvSpPr txBox="1"/>
-          <p:nvPr/>
-        </p:nvSpPr>
-        <p:spPr>
-          <a:xfrm>
-            <a:off x="1280159" y="1005840"/>
-            <a:ext cx="9601200" cy="5355203"/>
-          </a:xfrm>
-          <a:prstGeom prst="rect">
-            <a:avLst/>
-          </a:prstGeom>
-          <a:solidFill>
-            <a:schemeClr val="bg1"/>
-          </a:solidFill>
-          <a:ln>
-            <a:solidFill>
-              <a:schemeClr val="accent1"/>
-            </a:solidFill>
-          </a:ln>
-          <a:effectLst>
-            <a:outerShdw blurRad="50800" dist="38100" dir="2700000" algn="tl" rotWithShape="0">
-              <a:prstClr val="black">
-                <a:alpha val="40000"/>
-              </a:prstClr>
-            </a:outerShdw>
-          </a:effectLst>
-        </p:spPr>
-        <p:txBody>
-          <a:bodyPr wrap="square" rtlCol="0">
-            <a:normAutofit fontScale="92500"/>
-          </a:bodyPr>
-          <a:lstStyle>
-            <a:defPPr>
-              <a:defRPr lang="en-US"/>
-            </a:defPPr>
-            <a:lvl1pPr>
-              <a:defRPr>
-                <a:latin typeface="Courier" pitchFamily="2" charset="0"/>
-              </a:defRPr>
-            </a:lvl1pPr>
-          </a:lstStyle>
-          <a:p>
-            <a:r>
-              <a:rPr lang="en-US" sz="800" dirty="0"/>
-              <a:t>---</a:t>
-            </a:r>
-          </a:p>
-          <a:p>
-            <a:r>
-              <a:rPr lang="en-US" sz="800" dirty="0"/>
-              <a:t># =================================================</a:t>
-            </a:r>
-          </a:p>
-          <a:p>
-            <a:r>
-              <a:rPr lang="en-US" sz="800" dirty="0"/>
-              <a:t># Useful for pre-creating Safe consumers role and test secrets</a:t>
-            </a:r>
-          </a:p>
-          <a:p>
-            <a:r>
-              <a:rPr lang="en-US" sz="800" dirty="0"/>
-              <a:t># ahead of the Vault/</a:t>
-            </a:r>
-            <a:r>
-              <a:rPr lang="en-US" sz="800" dirty="0" err="1"/>
-              <a:t>Conjur</a:t>
-            </a:r>
-            <a:r>
-              <a:rPr lang="en-US" sz="800" dirty="0"/>
-              <a:t> synchronizer running.</a:t>
-            </a:r>
-          </a:p>
-          <a:p>
-            <a:r>
-              <a:rPr lang="en-US" sz="800" dirty="0"/>
-              <a:t># </a:t>
-            </a:r>
-          </a:p>
-          <a:p>
-            <a:r>
-              <a:rPr lang="en-US" sz="800" dirty="0"/>
-              <a:t># &gt;&gt; This policy must be loaded in APPEND (default) mode. &lt;&lt;</a:t>
-            </a:r>
-          </a:p>
-          <a:p>
-            <a:r>
-              <a:rPr lang="en-US" sz="800" dirty="0"/>
-              <a:t># =================================================</a:t>
-            </a:r>
-          </a:p>
-          <a:p>
-            <a:endParaRPr lang="en-US" sz="800" dirty="0"/>
-          </a:p>
-          <a:p>
-            <a:r>
-              <a:rPr lang="en-US" sz="800" dirty="0"/>
-              <a:t>#########################</a:t>
-            </a:r>
-          </a:p>
-          <a:p>
-            <a:r>
-              <a:rPr lang="en-US" sz="800" dirty="0"/>
-              <a:t># Vault RBAC</a:t>
-            </a:r>
-          </a:p>
-          <a:p>
-            <a:r>
-              <a:rPr lang="en-US" sz="800" dirty="0"/>
-              <a:t># - updates vault policy with LOB admin group</a:t>
-            </a:r>
-          </a:p>
-          <a:p>
-            <a:r>
-              <a:rPr lang="en-US" sz="800" dirty="0"/>
-              <a:t>- !policy</a:t>
-            </a:r>
-          </a:p>
-          <a:p>
-            <a:r>
-              <a:rPr lang="en-US" sz="800" dirty="0"/>
-              <a:t>  id: </a:t>
-            </a:r>
-            <a:r>
-              <a:rPr lang="en-US" sz="800" dirty="0" err="1"/>
-              <a:t>LabVault</a:t>
-            </a:r>
-            <a:endParaRPr lang="en-US" sz="800" dirty="0"/>
-          </a:p>
-          <a:p>
-            <a:r>
-              <a:rPr lang="en-US" sz="800" dirty="0"/>
-              <a:t>  owner: !group /</a:t>
-            </a:r>
-            <a:r>
-              <a:rPr lang="en-US" sz="800" dirty="0" err="1"/>
-              <a:t>LabVault</a:t>
-            </a:r>
-            <a:r>
-              <a:rPr lang="en-US" sz="800" dirty="0"/>
-              <a:t>-admins</a:t>
-            </a:r>
-          </a:p>
-          <a:p>
-            <a:r>
-              <a:rPr lang="en-US" sz="800" dirty="0"/>
-              <a:t>  body:</a:t>
-            </a:r>
-          </a:p>
-          <a:p>
-            <a:r>
-              <a:rPr lang="en-US" sz="800" dirty="0"/>
-              <a:t>  - !group </a:t>
-            </a:r>
-            <a:r>
-              <a:rPr lang="en-US" sz="800" dirty="0" err="1"/>
-              <a:t>LabLob</a:t>
-            </a:r>
-            <a:r>
-              <a:rPr lang="en-US" sz="800" dirty="0"/>
-              <a:t>-admins</a:t>
-            </a:r>
-          </a:p>
-          <a:p>
-            <a:endParaRPr lang="en-US" sz="800" dirty="0"/>
-          </a:p>
-          <a:p>
-            <a:r>
-              <a:rPr lang="en-US" sz="800" dirty="0"/>
-              <a:t>  #########################</a:t>
-            </a:r>
-          </a:p>
-          <a:p>
-            <a:r>
-              <a:rPr lang="en-US" sz="800" dirty="0"/>
-              <a:t>  # LOB RBAC</a:t>
-            </a:r>
-          </a:p>
-          <a:p>
-            <a:r>
-              <a:rPr lang="en-US" sz="800" dirty="0"/>
-              <a:t>  # - creates LOB policy owned by LOB admin group</a:t>
-            </a:r>
-          </a:p>
-          <a:p>
-            <a:r>
-              <a:rPr lang="en-US" sz="800" dirty="0"/>
-              <a:t>  # - creates safe admin group</a:t>
-            </a:r>
-          </a:p>
-          <a:p>
-            <a:r>
-              <a:rPr lang="en-US" sz="800" dirty="0"/>
-              <a:t>  - !policy</a:t>
-            </a:r>
-          </a:p>
-          <a:p>
-            <a:r>
-              <a:rPr lang="en-US" sz="800" dirty="0"/>
-              <a:t>    id: </a:t>
-            </a:r>
-            <a:r>
-              <a:rPr lang="en-US" sz="800" dirty="0" err="1"/>
-              <a:t>LabLob</a:t>
-            </a:r>
-            <a:endParaRPr lang="en-US" sz="800" dirty="0"/>
-          </a:p>
-          <a:p>
-            <a:r>
-              <a:rPr lang="en-US" sz="800" dirty="0"/>
-              <a:t>    owner: !group /</a:t>
-            </a:r>
-            <a:r>
-              <a:rPr lang="en-US" sz="800" dirty="0" err="1"/>
-              <a:t>LabVault</a:t>
-            </a:r>
-            <a:r>
-              <a:rPr lang="en-US" sz="800" dirty="0"/>
-              <a:t>/</a:t>
-            </a:r>
-            <a:r>
-              <a:rPr lang="en-US" sz="800" dirty="0" err="1"/>
-              <a:t>LabLob</a:t>
-            </a:r>
-            <a:r>
-              <a:rPr lang="en-US" sz="800" dirty="0"/>
-              <a:t>-admins</a:t>
-            </a:r>
-          </a:p>
-          <a:p>
-            <a:r>
-              <a:rPr lang="en-US" sz="800" dirty="0"/>
-              <a:t>    body:</a:t>
-            </a:r>
-          </a:p>
-          <a:p>
-            <a:r>
-              <a:rPr lang="en-US" sz="800" dirty="0"/>
-              <a:t>    - !group appteam1-admins</a:t>
-            </a:r>
-          </a:p>
-          <a:p>
-            <a:endParaRPr lang="en-US" sz="800" dirty="0"/>
-          </a:p>
-          <a:p>
-            <a:r>
-              <a:rPr lang="en-US" sz="800" dirty="0"/>
-              <a:t>    #########################</a:t>
-            </a:r>
-          </a:p>
-          <a:p>
-            <a:r>
-              <a:rPr lang="en-US" sz="800" dirty="0"/>
-              <a:t>    # Safe RBAC</a:t>
-            </a:r>
-          </a:p>
-          <a:p>
-            <a:r>
-              <a:rPr lang="en-US" sz="800" dirty="0"/>
-              <a:t>    # - creates sub-policy for safe</a:t>
-            </a:r>
-          </a:p>
-          <a:p>
-            <a:r>
-              <a:rPr lang="en-US" sz="800" dirty="0"/>
-              <a:t>    # - creates delegation sub-policy w/ consumers group</a:t>
-            </a:r>
-          </a:p>
-          <a:p>
-            <a:r>
-              <a:rPr lang="en-US" sz="800" dirty="0"/>
-              <a:t>    - !policy</a:t>
-            </a:r>
-          </a:p>
-          <a:p>
-            <a:r>
-              <a:rPr lang="en-US" sz="800" dirty="0"/>
-              <a:t>      id: appteam1</a:t>
-            </a:r>
-          </a:p>
-          <a:p>
-            <a:r>
-              <a:rPr lang="en-US" sz="800" dirty="0"/>
-              <a:t>      body:</a:t>
-            </a:r>
-          </a:p>
-          <a:p>
-            <a:r>
-              <a:rPr lang="en-US" sz="800" dirty="0"/>
-              <a:t>      - !policy</a:t>
-            </a:r>
-          </a:p>
-          <a:p>
-            <a:r>
-              <a:rPr lang="en-US" sz="800" dirty="0"/>
-              <a:t>        id: delegation</a:t>
-            </a:r>
-          </a:p>
-          <a:p>
-            <a:r>
-              <a:rPr lang="en-US" sz="800" dirty="0"/>
-              <a:t>        owner: !group /</a:t>
-            </a:r>
-            <a:r>
-              <a:rPr lang="en-US" sz="800" dirty="0" err="1"/>
-              <a:t>LabVault</a:t>
-            </a:r>
-            <a:r>
-              <a:rPr lang="en-US" sz="800" dirty="0"/>
-              <a:t>/</a:t>
-            </a:r>
-            <a:r>
-              <a:rPr lang="en-US" sz="800" dirty="0" err="1"/>
-              <a:t>LabLob</a:t>
-            </a:r>
-            <a:r>
-              <a:rPr lang="en-US" sz="800" dirty="0"/>
-              <a:t>/appteam1-admins</a:t>
-            </a:r>
-          </a:p>
-          <a:p>
-            <a:r>
-              <a:rPr lang="en-US" sz="800" dirty="0"/>
-              <a:t>        body:</a:t>
-            </a:r>
-          </a:p>
-          <a:p>
-            <a:r>
-              <a:rPr lang="en-US" sz="800" dirty="0"/>
-              <a:t>        - !group consumers</a:t>
-            </a:r>
-          </a:p>
-          <a:p>
-            <a:endParaRPr lang="en-US" sz="800" dirty="0"/>
-          </a:p>
-          <a:p>
-            <a:r>
-              <a:rPr lang="en-US" sz="800" dirty="0"/>
-              <a:t>      - &amp;variables</a:t>
-            </a:r>
-          </a:p>
-          <a:p>
-            <a:r>
-              <a:rPr lang="en-US" sz="800" dirty="0"/>
-              <a:t>        - !variable MySQL/username</a:t>
-            </a:r>
-          </a:p>
-          <a:p>
-            <a:r>
-              <a:rPr lang="en-US" sz="800" dirty="0"/>
-              <a:t>        - !variable MySQL/password</a:t>
-            </a:r>
-          </a:p>
-          <a:p>
-            <a:endParaRPr lang="en-US" sz="800" dirty="0"/>
-          </a:p>
-          <a:p>
-            <a:r>
-              <a:rPr lang="en-US" sz="800" dirty="0"/>
-              <a:t>      - !permit</a:t>
-            </a:r>
-          </a:p>
-          <a:p>
-            <a:r>
-              <a:rPr lang="en-US" sz="800" dirty="0"/>
-              <a:t>        role: !group delegation/consumers</a:t>
-            </a:r>
-          </a:p>
-          <a:p>
-            <a:r>
-              <a:rPr lang="en-US" sz="800" dirty="0"/>
-              <a:t>        privilege: [ read, execute ]</a:t>
-            </a:r>
-          </a:p>
-          <a:p>
-            <a:r>
-              <a:rPr lang="en-US" sz="800" dirty="0"/>
-              <a:t>        resource: *variables</a:t>
-            </a:r>
-          </a:p>
-        </p:txBody>
-      </p:sp>
-      <p:sp>
-        <p:nvSpPr>
-          <p:cNvPr id="2" name="TextBox 1">
-            <a:extLst>
-              <a:ext uri="{FF2B5EF4-FFF2-40B4-BE49-F238E27FC236}">
-                <a16:creationId xmlns:a16="http://schemas.microsoft.com/office/drawing/2014/main" id="{4F106CC0-482F-0C4E-8438-1D648A1F60BF}"/>
-              </a:ext>
-            </a:extLst>
-          </p:cNvPr>
-          <p:cNvSpPr txBox="1"/>
-          <p:nvPr/>
-        </p:nvSpPr>
-        <p:spPr>
-          <a:xfrm>
-            <a:off x="7354614" y="6897414"/>
-            <a:ext cx="0" cy="0"/>
-          </a:xfrm>
-          <a:prstGeom prst="rect">
-            <a:avLst/>
-          </a:prstGeom>
-          <a:noFill/>
-        </p:spPr>
-        <p:txBody>
-          <a:bodyPr wrap="none" rtlCol="0">
-            <a:normAutofit fontScale="25000" lnSpcReduction="20000"/>
-          </a:bodyPr>
-          <a:lstStyle/>
-          <a:p>
-            <a:endParaRPr lang="en-US" dirty="0"/>
+              <a:t> policies</a:t>
+            </a:r>
           </a:p>
         </p:txBody>
       </p:sp>
     </p:spTree>
     <p:extLst>
       <p:ext uri="{BB962C8B-B14F-4D97-AF65-F5344CB8AC3E}">
-        <p14:creationId xmlns:p14="http://schemas.microsoft.com/office/powerpoint/2010/main" val="1550378479"/>
+        <p14:creationId xmlns:p14="http://schemas.microsoft.com/office/powerpoint/2010/main" val="1843312914"/>
       </p:ext>
     </p:extLst>
   </p:cSld>
@@ -15161,13 +15047,8 @@
           <a:p>
             <a:r>
               <a:rPr lang="en-US" dirty="0"/>
-              <a:t>Delete-</a:t>
-            </a:r>
-            <a:r>
-              <a:rPr lang="en-US" dirty="0" err="1"/>
-              <a:t>safe.yml</a:t>
-            </a:r>
-            <a:endParaRPr lang="en-US" dirty="0"/>
+              <a:t>Appteam1-SYNc-primer.yml</a:t>
+            </a:r>
           </a:p>
         </p:txBody>
       </p:sp>
@@ -15209,7 +15090,7 @@
         </p:spPr>
         <p:txBody>
           <a:bodyPr wrap="square" rtlCol="0">
-            <a:normAutofit/>
+            <a:normAutofit fontScale="92500"/>
           </a:bodyPr>
           <a:lstStyle>
             <a:defPPr>
@@ -15236,19 +15117,13 @@
           <a:p>
             <a:r>
               <a:rPr lang="en-US" sz="800" dirty="0"/>
-              <a:t># When an LOB user is removed as a Safe member, the</a:t>
+              <a:t># Useful for pre-creating Safe consumers role and test secrets</a:t>
             </a:r>
           </a:p>
           <a:p>
             <a:r>
               <a:rPr lang="en-US" sz="800" dirty="0"/>
-              <a:t># Synchronizer does not currently delete the Safe policy</a:t>
-            </a:r>
-          </a:p>
-          <a:p>
-            <a:r>
-              <a:rPr lang="en-US" sz="800" dirty="0"/>
-              <a:t># and variables in </a:t>
+              <a:t># ahead of the Vault/</a:t>
             </a:r>
             <a:r>
               <a:rPr lang="en-US" sz="800" dirty="0" err="1"/>
@@ -15256,7 +15131,7 @@
             </a:r>
             <a:r>
               <a:rPr lang="en-US" sz="800" dirty="0"/>
-              <a:t>. This policy does that.</a:t>
+              <a:t> synchronizer running.</a:t>
             </a:r>
           </a:p>
           <a:p>
@@ -15268,7 +15143,7 @@
           <a:p>
             <a:r>
               <a:rPr lang="en-US" sz="800" dirty="0"/>
-              <a:t># &gt;&gt; This policy must be loaded in DELETE mode. &lt;&lt;</a:t>
+              <a:t># &gt;&gt; This policy must be loaded in APPEND (default) mode. &lt;&lt;</a:t>
             </a:r>
           </a:p>
           <a:p>
@@ -15283,33 +15158,42 @@
           <a:p>
             <a:r>
               <a:rPr lang="en-US" sz="800" dirty="0"/>
-              <a:t>- !delete</a:t>
+              <a:t>#########################</a:t>
             </a:r>
           </a:p>
           <a:p>
             <a:r>
               <a:rPr lang="en-US" sz="800" dirty="0"/>
-              <a:t>  record: !policy </a:t>
+              <a:t># Vault RBAC</a:t>
+            </a:r>
+          </a:p>
+          <a:p>
+            <a:r>
+              <a:rPr lang="en-US" sz="800" dirty="0"/>
+              <a:t># - updates vault policy with LOB admin group</a:t>
+            </a:r>
+          </a:p>
+          <a:p>
+            <a:r>
+              <a:rPr lang="en-US" sz="800" dirty="0"/>
+              <a:t>- !policy</a:t>
+            </a:r>
+          </a:p>
+          <a:p>
+            <a:r>
+              <a:rPr lang="en-US" sz="800" dirty="0"/>
+              <a:t>  id: </a:t>
             </a:r>
             <a:r>
               <a:rPr lang="en-US" sz="800" dirty="0" err="1"/>
               <a:t>LabVault</a:t>
             </a:r>
+            <a:endParaRPr lang="en-US" sz="800" dirty="0"/>
+          </a:p>
+          <a:p>
             <a:r>
               <a:rPr lang="en-US" sz="800" dirty="0"/>
-              <a:t>/Labs/LabSafe1</a:t>
-            </a:r>
-          </a:p>
-          <a:p>
-            <a:r>
-              <a:rPr lang="en-US" sz="800" dirty="0"/>
-              <a:t>- !delete</a:t>
-            </a:r>
-          </a:p>
-          <a:p>
-            <a:r>
-              <a:rPr lang="en-US" sz="800" dirty="0"/>
-              <a:t>  record: !group </a:t>
+              <a:t>  owner: !group /</a:t>
             </a:r>
             <a:r>
               <a:rPr lang="en-US" sz="800" dirty="0" err="1"/>
@@ -15317,19 +15201,77 @@
             </a:r>
             <a:r>
               <a:rPr lang="en-US" sz="800" dirty="0"/>
-              <a:t>/Labs/LabSafe1-admins</a:t>
+              <a:t>-admins</a:t>
             </a:r>
           </a:p>
           <a:p>
             <a:r>
               <a:rPr lang="en-US" sz="800" dirty="0"/>
-              <a:t>- !delete</a:t>
+              <a:t>  body:</a:t>
             </a:r>
           </a:p>
           <a:p>
             <a:r>
               <a:rPr lang="en-US" sz="800" dirty="0"/>
-              <a:t>  record: !variable </a:t>
+              <a:t>  - !group </a:t>
+            </a:r>
+            <a:r>
+              <a:rPr lang="en-US" sz="800" dirty="0" err="1"/>
+              <a:t>LabLob</a:t>
+            </a:r>
+            <a:r>
+              <a:rPr lang="en-US" sz="800" dirty="0"/>
+              <a:t>-admins</a:t>
+            </a:r>
+          </a:p>
+          <a:p>
+            <a:endParaRPr lang="en-US" sz="800" dirty="0"/>
+          </a:p>
+          <a:p>
+            <a:r>
+              <a:rPr lang="en-US" sz="800" dirty="0"/>
+              <a:t>  #########################</a:t>
+            </a:r>
+          </a:p>
+          <a:p>
+            <a:r>
+              <a:rPr lang="en-US" sz="800" dirty="0"/>
+              <a:t>  # LOB RBAC</a:t>
+            </a:r>
+          </a:p>
+          <a:p>
+            <a:r>
+              <a:rPr lang="en-US" sz="800" dirty="0"/>
+              <a:t>  # - creates LOB policy owned by LOB admin group</a:t>
+            </a:r>
+          </a:p>
+          <a:p>
+            <a:r>
+              <a:rPr lang="en-US" sz="800" dirty="0"/>
+              <a:t>  # - creates safe admin group</a:t>
+            </a:r>
+          </a:p>
+          <a:p>
+            <a:r>
+              <a:rPr lang="en-US" sz="800" dirty="0"/>
+              <a:t>  - !policy</a:t>
+            </a:r>
+          </a:p>
+          <a:p>
+            <a:r>
+              <a:rPr lang="en-US" sz="800" dirty="0"/>
+              <a:t>    id: </a:t>
+            </a:r>
+            <a:r>
+              <a:rPr lang="en-US" sz="800" dirty="0" err="1"/>
+              <a:t>LabLob</a:t>
+            </a:r>
+            <a:endParaRPr lang="en-US" sz="800" dirty="0"/>
+          </a:p>
+          <a:p>
+            <a:r>
+              <a:rPr lang="en-US" sz="800" dirty="0"/>
+              <a:t>    owner: !group /</a:t>
             </a:r>
             <a:r>
               <a:rPr lang="en-US" sz="800" dirty="0" err="1"/>
@@ -15337,19 +15279,90 @@
             </a:r>
             <a:r>
               <a:rPr lang="en-US" sz="800" dirty="0"/>
-              <a:t>/Labs/LabSafe1/MySQL/username</a:t>
-            </a:r>
-          </a:p>
-          <a:p>
+              <a:t>/</a:t>
+            </a:r>
+            <a:r>
+              <a:rPr lang="en-US" sz="800" dirty="0" err="1"/>
+              <a:t>LabLob</a:t>
+            </a:r>
             <a:r>
               <a:rPr lang="en-US" sz="800" dirty="0"/>
-              <a:t>- !delete</a:t>
+              <a:t>-admins</a:t>
             </a:r>
           </a:p>
           <a:p>
             <a:r>
               <a:rPr lang="en-US" sz="800" dirty="0"/>
-              <a:t>  record: !variable </a:t>
+              <a:t>    body:</a:t>
+            </a:r>
+          </a:p>
+          <a:p>
+            <a:r>
+              <a:rPr lang="en-US" sz="800" dirty="0"/>
+              <a:t>    - !group appteam1-admins</a:t>
+            </a:r>
+          </a:p>
+          <a:p>
+            <a:endParaRPr lang="en-US" sz="800" dirty="0"/>
+          </a:p>
+          <a:p>
+            <a:r>
+              <a:rPr lang="en-US" sz="800" dirty="0"/>
+              <a:t>    #########################</a:t>
+            </a:r>
+          </a:p>
+          <a:p>
+            <a:r>
+              <a:rPr lang="en-US" sz="800" dirty="0"/>
+              <a:t>    # Safe RBAC</a:t>
+            </a:r>
+          </a:p>
+          <a:p>
+            <a:r>
+              <a:rPr lang="en-US" sz="800" dirty="0"/>
+              <a:t>    # - creates sub-policy for safe</a:t>
+            </a:r>
+          </a:p>
+          <a:p>
+            <a:r>
+              <a:rPr lang="en-US" sz="800" dirty="0"/>
+              <a:t>    # - creates delegation sub-policy w/ consumers group</a:t>
+            </a:r>
+          </a:p>
+          <a:p>
+            <a:r>
+              <a:rPr lang="en-US" sz="800" dirty="0"/>
+              <a:t>    - !policy</a:t>
+            </a:r>
+          </a:p>
+          <a:p>
+            <a:r>
+              <a:rPr lang="en-US" sz="800" dirty="0"/>
+              <a:t>      id: appteam1</a:t>
+            </a:r>
+          </a:p>
+          <a:p>
+            <a:r>
+              <a:rPr lang="en-US" sz="800" dirty="0"/>
+              <a:t>      body:</a:t>
+            </a:r>
+          </a:p>
+          <a:p>
+            <a:r>
+              <a:rPr lang="en-US" sz="800" dirty="0"/>
+              <a:t>      - !policy</a:t>
+            </a:r>
+          </a:p>
+          <a:p>
+            <a:r>
+              <a:rPr lang="en-US" sz="800" dirty="0"/>
+              <a:t>        id: delegation</a:t>
+            </a:r>
+          </a:p>
+          <a:p>
+            <a:r>
+              <a:rPr lang="en-US" sz="800" dirty="0"/>
+              <a:t>        owner: !group /</a:t>
             </a:r>
             <a:r>
               <a:rPr lang="en-US" sz="800" dirty="0" err="1"/>
@@ -15357,7 +15370,75 @@
             </a:r>
             <a:r>
               <a:rPr lang="en-US" sz="800" dirty="0"/>
-              <a:t>/Labs/LabSafe1/MySQL/password</a:t>
+              <a:t>/</a:t>
+            </a:r>
+            <a:r>
+              <a:rPr lang="en-US" sz="800" dirty="0" err="1"/>
+              <a:t>LabLob</a:t>
+            </a:r>
+            <a:r>
+              <a:rPr lang="en-US" sz="800" dirty="0"/>
+              <a:t>/appteam1-admins</a:t>
+            </a:r>
+          </a:p>
+          <a:p>
+            <a:r>
+              <a:rPr lang="en-US" sz="800" dirty="0"/>
+              <a:t>        body:</a:t>
+            </a:r>
+          </a:p>
+          <a:p>
+            <a:r>
+              <a:rPr lang="en-US" sz="800" dirty="0"/>
+              <a:t>        - !group consumers</a:t>
+            </a:r>
+          </a:p>
+          <a:p>
+            <a:endParaRPr lang="en-US" sz="800" dirty="0"/>
+          </a:p>
+          <a:p>
+            <a:r>
+              <a:rPr lang="en-US" sz="800" dirty="0"/>
+              <a:t>      - &amp;variables</a:t>
+            </a:r>
+          </a:p>
+          <a:p>
+            <a:r>
+              <a:rPr lang="en-US" sz="800" dirty="0"/>
+              <a:t>        - !variable MySQL/username</a:t>
+            </a:r>
+          </a:p>
+          <a:p>
+            <a:r>
+              <a:rPr lang="en-US" sz="800" dirty="0"/>
+              <a:t>        - !variable MySQL/password</a:t>
+            </a:r>
+          </a:p>
+          <a:p>
+            <a:endParaRPr lang="en-US" sz="800" dirty="0"/>
+          </a:p>
+          <a:p>
+            <a:r>
+              <a:rPr lang="en-US" sz="800" dirty="0"/>
+              <a:t>      - !permit</a:t>
+            </a:r>
+          </a:p>
+          <a:p>
+            <a:r>
+              <a:rPr lang="en-US" sz="800" dirty="0"/>
+              <a:t>        role: !group delegation/consumers</a:t>
+            </a:r>
+          </a:p>
+          <a:p>
+            <a:r>
+              <a:rPr lang="en-US" sz="800" dirty="0"/>
+              <a:t>        privilege: [ read, execute ]</a:t>
+            </a:r>
+          </a:p>
+          <a:p>
+            <a:r>
+              <a:rPr lang="en-US" sz="800" dirty="0"/>
+              <a:t>        resource: *variables</a:t>
             </a:r>
           </a:p>
         </p:txBody>
@@ -15397,7 +15478,7 @@
     </p:spTree>
     <p:extLst>
       <p:ext uri="{BB962C8B-B14F-4D97-AF65-F5344CB8AC3E}">
-        <p14:creationId xmlns:p14="http://schemas.microsoft.com/office/powerpoint/2010/main" val="3877547888"/>
+        <p14:creationId xmlns:p14="http://schemas.microsoft.com/office/powerpoint/2010/main" val="1550378479"/>
       </p:ext>
     </p:extLst>
   </p:cSld>
@@ -15438,10 +15519,10 @@
       </p:grpSpPr>
       <p:sp>
         <p:nvSpPr>
-          <p:cNvPr id="2" name="Slide Number Placeholder 1">
+          <p:cNvPr id="4" name="Slide Number Placeholder 3">
             <a:extLst>
               <a:ext uri="{FF2B5EF4-FFF2-40B4-BE49-F238E27FC236}">
-                <a16:creationId xmlns:a16="http://schemas.microsoft.com/office/drawing/2014/main" id="{5EC97ABF-19C3-294F-ABCA-2F04B320DDE6}"/>
+                <a16:creationId xmlns:a16="http://schemas.microsoft.com/office/drawing/2014/main" id="{DA2DA963-B453-8B49-B87E-D10D73997E40}"/>
               </a:ext>
             </a:extLst>
           </p:cNvPr>
@@ -15468,10 +15549,10 @@
       </p:sp>
       <p:sp>
         <p:nvSpPr>
-          <p:cNvPr id="3" name="Title 2">
+          <p:cNvPr id="5" name="Title 4">
             <a:extLst>
               <a:ext uri="{FF2B5EF4-FFF2-40B4-BE49-F238E27FC236}">
-                <a16:creationId xmlns:a16="http://schemas.microsoft.com/office/drawing/2014/main" id="{30E999E7-AA24-AC4F-B2A0-410958FBEE46}"/>
+                <a16:creationId xmlns:a16="http://schemas.microsoft.com/office/drawing/2014/main" id="{3CA291E2-4C43-4846-AA5A-1C8052DF8AEA}"/>
               </a:ext>
             </a:extLst>
           </p:cNvPr>
@@ -15489,15 +15570,243 @@
           <a:p>
             <a:r>
               <a:rPr lang="en-US" dirty="0"/>
-              <a:t>end</a:t>
-            </a:r>
+              <a:t>Delete-</a:t>
+            </a:r>
+            <a:r>
+              <a:rPr lang="en-US" dirty="0" err="1"/>
+              <a:t>safe.yml</a:t>
+            </a:r>
+            <a:endParaRPr lang="en-US" dirty="0"/>
+          </a:p>
+        </p:txBody>
+      </p:sp>
+      <p:sp>
+        <p:nvSpPr>
+          <p:cNvPr id="6" name="TextBox 5">
+            <a:extLst>
+              <a:ext uri="{FF2B5EF4-FFF2-40B4-BE49-F238E27FC236}">
+                <a16:creationId xmlns:a16="http://schemas.microsoft.com/office/drawing/2014/main" id="{447548D3-2201-2847-801D-1F6DD6126392}"/>
+              </a:ext>
+            </a:extLst>
+          </p:cNvPr>
+          <p:cNvSpPr txBox="1"/>
+          <p:nvPr/>
+        </p:nvSpPr>
+        <p:spPr>
+          <a:xfrm>
+            <a:off x="1280159" y="1005840"/>
+            <a:ext cx="9601200" cy="5355203"/>
+          </a:xfrm>
+          <a:prstGeom prst="rect">
+            <a:avLst/>
+          </a:prstGeom>
+          <a:solidFill>
+            <a:schemeClr val="bg1"/>
+          </a:solidFill>
+          <a:ln>
+            <a:solidFill>
+              <a:schemeClr val="accent1"/>
+            </a:solidFill>
+          </a:ln>
+          <a:effectLst>
+            <a:outerShdw blurRad="50800" dist="38100" dir="2700000" algn="tl" rotWithShape="0">
+              <a:prstClr val="black">
+                <a:alpha val="40000"/>
+              </a:prstClr>
+            </a:outerShdw>
+          </a:effectLst>
+        </p:spPr>
+        <p:txBody>
+          <a:bodyPr wrap="square" rtlCol="0">
+            <a:normAutofit/>
+          </a:bodyPr>
+          <a:lstStyle>
+            <a:defPPr>
+              <a:defRPr lang="en-US"/>
+            </a:defPPr>
+            <a:lvl1pPr>
+              <a:defRPr>
+                <a:latin typeface="Courier" pitchFamily="2" charset="0"/>
+              </a:defRPr>
+            </a:lvl1pPr>
+          </a:lstStyle>
+          <a:p>
+            <a:r>
+              <a:rPr lang="en-US" sz="800" dirty="0"/>
+              <a:t>---</a:t>
+            </a:r>
+          </a:p>
+          <a:p>
+            <a:r>
+              <a:rPr lang="en-US" sz="800" dirty="0"/>
+              <a:t># =================================================</a:t>
+            </a:r>
+          </a:p>
+          <a:p>
+            <a:r>
+              <a:rPr lang="en-US" sz="800" dirty="0"/>
+              <a:t># When an LOB user is removed as a Safe member, the</a:t>
+            </a:r>
+          </a:p>
+          <a:p>
+            <a:r>
+              <a:rPr lang="en-US" sz="800" dirty="0"/>
+              <a:t># Synchronizer does not currently delete the Safe policy</a:t>
+            </a:r>
+          </a:p>
+          <a:p>
+            <a:r>
+              <a:rPr lang="en-US" sz="800" dirty="0"/>
+              <a:t># and variables in </a:t>
+            </a:r>
+            <a:r>
+              <a:rPr lang="en-US" sz="800" dirty="0" err="1"/>
+              <a:t>Conjur</a:t>
+            </a:r>
+            <a:r>
+              <a:rPr lang="en-US" sz="800" dirty="0"/>
+              <a:t>. This policy does that.</a:t>
+            </a:r>
+          </a:p>
+          <a:p>
+            <a:r>
+              <a:rPr lang="en-US" sz="800" dirty="0"/>
+              <a:t># </a:t>
+            </a:r>
+          </a:p>
+          <a:p>
+            <a:r>
+              <a:rPr lang="en-US" sz="800" dirty="0"/>
+              <a:t># &gt;&gt; This policy must be loaded in DELETE mode. &lt;&lt;</a:t>
+            </a:r>
+          </a:p>
+          <a:p>
+            <a:r>
+              <a:rPr lang="en-US" sz="800" dirty="0"/>
+              <a:t># =================================================</a:t>
+            </a:r>
+          </a:p>
+          <a:p>
+            <a:endParaRPr lang="en-US" sz="800" dirty="0"/>
+          </a:p>
+          <a:p>
+            <a:r>
+              <a:rPr lang="en-US" sz="800" dirty="0"/>
+              <a:t>- !delete</a:t>
+            </a:r>
+          </a:p>
+          <a:p>
+            <a:r>
+              <a:rPr lang="en-US" sz="800" dirty="0"/>
+              <a:t>  record: !policy </a:t>
+            </a:r>
+            <a:r>
+              <a:rPr lang="en-US" sz="800" dirty="0" err="1"/>
+              <a:t>LabVault</a:t>
+            </a:r>
+            <a:r>
+              <a:rPr lang="en-US" sz="800" dirty="0"/>
+              <a:t>/Labs/LabSafe1</a:t>
+            </a:r>
+          </a:p>
+          <a:p>
+            <a:r>
+              <a:rPr lang="en-US" sz="800" dirty="0"/>
+              <a:t>- !delete</a:t>
+            </a:r>
+          </a:p>
+          <a:p>
+            <a:r>
+              <a:rPr lang="en-US" sz="800" dirty="0"/>
+              <a:t>  record: !group </a:t>
+            </a:r>
+            <a:r>
+              <a:rPr lang="en-US" sz="800" dirty="0" err="1"/>
+              <a:t>LabVault</a:t>
+            </a:r>
+            <a:r>
+              <a:rPr lang="en-US" sz="800" dirty="0"/>
+              <a:t>/Labs/LabSafe1-admins</a:t>
+            </a:r>
+          </a:p>
+          <a:p>
+            <a:r>
+              <a:rPr lang="en-US" sz="800" dirty="0"/>
+              <a:t>- !delete</a:t>
+            </a:r>
+          </a:p>
+          <a:p>
+            <a:r>
+              <a:rPr lang="en-US" sz="800" dirty="0"/>
+              <a:t>  record: !variable </a:t>
+            </a:r>
+            <a:r>
+              <a:rPr lang="en-US" sz="800" dirty="0" err="1"/>
+              <a:t>LabVault</a:t>
+            </a:r>
+            <a:r>
+              <a:rPr lang="en-US" sz="800" dirty="0"/>
+              <a:t>/Labs/LabSafe1/MySQL/username</a:t>
+            </a:r>
+          </a:p>
+          <a:p>
+            <a:r>
+              <a:rPr lang="en-US" sz="800" dirty="0"/>
+              <a:t>- !delete</a:t>
+            </a:r>
+          </a:p>
+          <a:p>
+            <a:r>
+              <a:rPr lang="en-US" sz="800" dirty="0"/>
+              <a:t>  record: !variable </a:t>
+            </a:r>
+            <a:r>
+              <a:rPr lang="en-US" sz="800" dirty="0" err="1"/>
+              <a:t>LabVault</a:t>
+            </a:r>
+            <a:r>
+              <a:rPr lang="en-US" sz="800" dirty="0"/>
+              <a:t>/Labs/LabSafe1/MySQL/password</a:t>
+            </a:r>
+          </a:p>
+        </p:txBody>
+      </p:sp>
+      <p:sp>
+        <p:nvSpPr>
+          <p:cNvPr id="2" name="TextBox 1">
+            <a:extLst>
+              <a:ext uri="{FF2B5EF4-FFF2-40B4-BE49-F238E27FC236}">
+                <a16:creationId xmlns:a16="http://schemas.microsoft.com/office/drawing/2014/main" id="{4F106CC0-482F-0C4E-8438-1D648A1F60BF}"/>
+              </a:ext>
+            </a:extLst>
+          </p:cNvPr>
+          <p:cNvSpPr txBox="1"/>
+          <p:nvPr/>
+        </p:nvSpPr>
+        <p:spPr>
+          <a:xfrm>
+            <a:off x="7354614" y="6897414"/>
+            <a:ext cx="0" cy="0"/>
+          </a:xfrm>
+          <a:prstGeom prst="rect">
+            <a:avLst/>
+          </a:prstGeom>
+          <a:noFill/>
+        </p:spPr>
+        <p:txBody>
+          <a:bodyPr wrap="none" rtlCol="0">
+            <a:normAutofit fontScale="25000" lnSpcReduction="20000"/>
+          </a:bodyPr>
+          <a:lstStyle/>
+          <a:p>
+            <a:endParaRPr lang="en-US" dirty="0"/>
           </a:p>
         </p:txBody>
       </p:sp>
     </p:spTree>
     <p:extLst>
       <p:ext uri="{BB962C8B-B14F-4D97-AF65-F5344CB8AC3E}">
-        <p14:creationId xmlns:p14="http://schemas.microsoft.com/office/powerpoint/2010/main" val="3685336371"/>
+        <p14:creationId xmlns:p14="http://schemas.microsoft.com/office/powerpoint/2010/main" val="3877547888"/>
       </p:ext>
     </p:extLst>
   </p:cSld>
@@ -15538,6 +15847,106 @@
       </p:grpSpPr>
       <p:sp>
         <p:nvSpPr>
+          <p:cNvPr id="2" name="Slide Number Placeholder 1">
+            <a:extLst>
+              <a:ext uri="{FF2B5EF4-FFF2-40B4-BE49-F238E27FC236}">
+                <a16:creationId xmlns:a16="http://schemas.microsoft.com/office/drawing/2014/main" id="{5EC97ABF-19C3-294F-ABCA-2F04B320DDE6}"/>
+              </a:ext>
+            </a:extLst>
+          </p:cNvPr>
+          <p:cNvSpPr>
+            <a:spLocks noGrp="1"/>
+          </p:cNvSpPr>
+          <p:nvPr>
+            <p:ph type="sldNum" sz="quarter" idx="12"/>
+          </p:nvPr>
+        </p:nvSpPr>
+        <p:spPr/>
+        <p:txBody>
+          <a:bodyPr/>
+          <a:lstStyle/>
+          <a:p>
+            <a:fld id="{3DB5E446-421A-E746-A83E-D1D14D8D9CBB}" type="slidenum">
+              <a:rPr lang="en-US" smtClean="0"/>
+              <a:pPr/>
+              <a:t>27</a:t>
+            </a:fld>
+            <a:endParaRPr lang="en-US"/>
+          </a:p>
+        </p:txBody>
+      </p:sp>
+      <p:sp>
+        <p:nvSpPr>
+          <p:cNvPr id="3" name="Title 2">
+            <a:extLst>
+              <a:ext uri="{FF2B5EF4-FFF2-40B4-BE49-F238E27FC236}">
+                <a16:creationId xmlns:a16="http://schemas.microsoft.com/office/drawing/2014/main" id="{30E999E7-AA24-AC4F-B2A0-410958FBEE46}"/>
+              </a:ext>
+            </a:extLst>
+          </p:cNvPr>
+          <p:cNvSpPr>
+            <a:spLocks noGrp="1"/>
+          </p:cNvSpPr>
+          <p:nvPr>
+            <p:ph type="title"/>
+          </p:nvPr>
+        </p:nvSpPr>
+        <p:spPr/>
+        <p:txBody>
+          <a:bodyPr/>
+          <a:lstStyle/>
+          <a:p>
+            <a:r>
+              <a:rPr lang="en-US" dirty="0"/>
+              <a:t>end</a:t>
+            </a:r>
+          </a:p>
+        </p:txBody>
+      </p:sp>
+    </p:spTree>
+    <p:extLst>
+      <p:ext uri="{BB962C8B-B14F-4D97-AF65-F5344CB8AC3E}">
+        <p14:creationId xmlns:p14="http://schemas.microsoft.com/office/powerpoint/2010/main" val="3685336371"/>
+      </p:ext>
+    </p:extLst>
+  </p:cSld>
+  <p:clrMapOvr>
+    <a:masterClrMapping/>
+  </p:clrMapOvr>
+  <mc:AlternateContent xmlns:mc="http://schemas.openxmlformats.org/markup-compatibility/2006" xmlns:p14="http://schemas.microsoft.com/office/powerpoint/2010/main">
+    <mc:Choice Requires="p14">
+      <p:transition spd="med" p14:dur="700">
+        <p:fade/>
+      </p:transition>
+    </mc:Choice>
+    <mc:Fallback xmlns="">
+      <p:transition spd="med">
+        <p:fade/>
+      </p:transition>
+    </mc:Fallback>
+  </mc:AlternateContent>
+</p:sld>
+</file>
+
+<file path=ppt/slides/slide28.xml><?xml version="1.0" encoding="utf-8"?>
+<p:sld xmlns:a="http://schemas.openxmlformats.org/drawingml/2006/main" xmlns:r="http://schemas.openxmlformats.org/officeDocument/2006/relationships" xmlns:p="http://schemas.openxmlformats.org/presentationml/2006/main">
+  <p:cSld>
+    <p:spTree>
+      <p:nvGrpSpPr>
+        <p:cNvPr id="1" name=""/>
+        <p:cNvGrpSpPr/>
+        <p:nvPr/>
+      </p:nvGrpSpPr>
+      <p:grpSpPr>
+        <a:xfrm>
+          <a:off x="0" y="0"/>
+          <a:ext cx="0" cy="0"/>
+          <a:chOff x="0" y="0"/>
+          <a:chExt cx="0" cy="0"/>
+        </a:xfrm>
+      </p:grpSpPr>
+      <p:sp>
+        <p:nvSpPr>
           <p:cNvPr id="2" name="Content Placeholder 1">
             <a:extLst>
               <a:ext uri="{FF2B5EF4-FFF2-40B4-BE49-F238E27FC236}">
@@ -15694,7 +16103,7 @@
           <a:p>
             <a:fld id="{3DB5E446-421A-E746-A83E-D1D14D8D9CBB}" type="slidenum">
               <a:rPr lang="en-US" smtClean="0"/>
-              <a:t>27</a:t>
+              <a:t>28</a:t>
             </a:fld>
             <a:endParaRPr lang="en-US"/>
           </a:p>

</xml_diff>

<commit_message>
fix PUT/PATCH on slides
</commit_message>
<xml_diff>
--- a/ppt/DAP-Policy-Model-200615JH.pptx
+++ b/ppt/DAP-Policy-Model-200615JH.pptx
@@ -258,7 +258,7 @@
           <a:p>
             <a:fld id="{731C07B1-AB0B-5848-BE9C-30B9B2692C04}" type="datetimeFigureOut">
               <a:rPr lang="en-US" smtClean="0"/>
-              <a:t>6/23/20</a:t>
+              <a:t>11/19/20</a:t>
             </a:fld>
             <a:endParaRPr lang="en-US"/>
           </a:p>
@@ -17419,7 +17419,7 @@
             <a:pPr lvl="1"/>
             <a:r>
               <a:rPr lang="en-US" dirty="0"/>
-              <a:t>Implemented as REST PUT operation</a:t>
+              <a:t>Implemented as REST POST operation</a:t>
             </a:r>
           </a:p>
           <a:p>
@@ -18506,7 +18506,7 @@
             <a:pPr lvl="1"/>
             <a:r>
               <a:rPr lang="en-US" dirty="0"/>
-              <a:t>Implemented as REST POST operation</a:t>
+              <a:t>Implemented as REST PUT operation</a:t>
             </a:r>
           </a:p>
           <a:p>

</xml_diff>